<commit_message>
Finished presentation, removed p-values from tables for purposes of interim presentation.
</commit_message>
<xml_diff>
--- a/Project1/Reports/Project 1 Interim Presentation.pptx
+++ b/Project1/Reports/Project 1 Interim Presentation.pptx
@@ -2,14 +2,13 @@
 <file path=ppt/presentation.xml><?xml version="1.0" encoding="utf-8"?>
 <p:presentation xmlns:a="http://schemas.openxmlformats.org/drawingml/2006/main" xmlns:r="http://schemas.openxmlformats.org/officeDocument/2006/relationships" xmlns:p="http://schemas.openxmlformats.org/presentationml/2006/main" saveSubsetFonts="1">
   <p:sldMasterIdLst>
-    <p:sldMasterId id="2147483648" r:id="rId1"/>
+    <p:sldMasterId id="2147483684" r:id="rId1"/>
   </p:sldMasterIdLst>
   <p:sldIdLst>
     <p:sldId id="256" r:id="rId2"/>
     <p:sldId id="257" r:id="rId3"/>
-    <p:sldId id="260" r:id="rId4"/>
+    <p:sldId id="261" r:id="rId4"/>
     <p:sldId id="259" r:id="rId5"/>
-    <p:sldId id="258" r:id="rId6"/>
   </p:sldIdLst>
   <p:sldSz cx="12192000" cy="6858000"/>
   <p:notesSz cx="6858000" cy="9144000"/>
@@ -17,7 +16,7 @@
     <a:defPPr>
       <a:defRPr lang="en-US"/>
     </a:defPPr>
-    <a:lvl1pPr marL="0" algn="l" defTabSz="914400" rtl="0" eaLnBrk="1" latinLnBrk="0" hangingPunct="1">
+    <a:lvl1pPr marL="0" algn="l" defTabSz="457200" rtl="0" eaLnBrk="1" latinLnBrk="0" hangingPunct="1">
       <a:defRPr sz="1800" kern="1200">
         <a:solidFill>
           <a:schemeClr val="tx1"/>
@@ -27,7 +26,7 @@
         <a:cs typeface="+mn-cs"/>
       </a:defRPr>
     </a:lvl1pPr>
-    <a:lvl2pPr marL="457200" algn="l" defTabSz="914400" rtl="0" eaLnBrk="1" latinLnBrk="0" hangingPunct="1">
+    <a:lvl2pPr marL="457200" algn="l" defTabSz="457200" rtl="0" eaLnBrk="1" latinLnBrk="0" hangingPunct="1">
       <a:defRPr sz="1800" kern="1200">
         <a:solidFill>
           <a:schemeClr val="tx1"/>
@@ -37,7 +36,7 @@
         <a:cs typeface="+mn-cs"/>
       </a:defRPr>
     </a:lvl2pPr>
-    <a:lvl3pPr marL="914400" algn="l" defTabSz="914400" rtl="0" eaLnBrk="1" latinLnBrk="0" hangingPunct="1">
+    <a:lvl3pPr marL="914400" algn="l" defTabSz="457200" rtl="0" eaLnBrk="1" latinLnBrk="0" hangingPunct="1">
       <a:defRPr sz="1800" kern="1200">
         <a:solidFill>
           <a:schemeClr val="tx1"/>
@@ -47,7 +46,7 @@
         <a:cs typeface="+mn-cs"/>
       </a:defRPr>
     </a:lvl3pPr>
-    <a:lvl4pPr marL="1371600" algn="l" defTabSz="914400" rtl="0" eaLnBrk="1" latinLnBrk="0" hangingPunct="1">
+    <a:lvl4pPr marL="1371600" algn="l" defTabSz="457200" rtl="0" eaLnBrk="1" latinLnBrk="0" hangingPunct="1">
       <a:defRPr sz="1800" kern="1200">
         <a:solidFill>
           <a:schemeClr val="tx1"/>
@@ -57,7 +56,7 @@
         <a:cs typeface="+mn-cs"/>
       </a:defRPr>
     </a:lvl4pPr>
-    <a:lvl5pPr marL="1828800" algn="l" defTabSz="914400" rtl="0" eaLnBrk="1" latinLnBrk="0" hangingPunct="1">
+    <a:lvl5pPr marL="1828800" algn="l" defTabSz="457200" rtl="0" eaLnBrk="1" latinLnBrk="0" hangingPunct="1">
       <a:defRPr sz="1800" kern="1200">
         <a:solidFill>
           <a:schemeClr val="tx1"/>
@@ -67,7 +66,7 @@
         <a:cs typeface="+mn-cs"/>
       </a:defRPr>
     </a:lvl5pPr>
-    <a:lvl6pPr marL="2286000" algn="l" defTabSz="914400" rtl="0" eaLnBrk="1" latinLnBrk="0" hangingPunct="1">
+    <a:lvl6pPr marL="2286000" algn="l" defTabSz="457200" rtl="0" eaLnBrk="1" latinLnBrk="0" hangingPunct="1">
       <a:defRPr sz="1800" kern="1200">
         <a:solidFill>
           <a:schemeClr val="tx1"/>
@@ -77,7 +76,7 @@
         <a:cs typeface="+mn-cs"/>
       </a:defRPr>
     </a:lvl6pPr>
-    <a:lvl7pPr marL="2743200" algn="l" defTabSz="914400" rtl="0" eaLnBrk="1" latinLnBrk="0" hangingPunct="1">
+    <a:lvl7pPr marL="2743200" algn="l" defTabSz="457200" rtl="0" eaLnBrk="1" latinLnBrk="0" hangingPunct="1">
       <a:defRPr sz="1800" kern="1200">
         <a:solidFill>
           <a:schemeClr val="tx1"/>
@@ -87,7 +86,7 @@
         <a:cs typeface="+mn-cs"/>
       </a:defRPr>
     </a:lvl7pPr>
-    <a:lvl8pPr marL="3200400" algn="l" defTabSz="914400" rtl="0" eaLnBrk="1" latinLnBrk="0" hangingPunct="1">
+    <a:lvl8pPr marL="3200400" algn="l" defTabSz="457200" rtl="0" eaLnBrk="1" latinLnBrk="0" hangingPunct="1">
       <a:defRPr sz="1800" kern="1200">
         <a:solidFill>
           <a:schemeClr val="tx1"/>
@@ -97,7 +96,7 @@
         <a:cs typeface="+mn-cs"/>
       </a:defRPr>
     </a:lvl8pPr>
-    <a:lvl9pPr marL="3657600" algn="l" defTabSz="914400" rtl="0" eaLnBrk="1" latinLnBrk="0" hangingPunct="1">
+    <a:lvl9pPr marL="3657600" algn="l" defTabSz="457200" rtl="0" eaLnBrk="1" latinLnBrk="0" hangingPunct="1">
       <a:defRPr sz="1800" kern="1200">
         <a:solidFill>
           <a:schemeClr val="tx1"/>
@@ -108,6 +107,11 @@
       </a:defRPr>
     </a:lvl9pPr>
   </p:defaultTextStyle>
+  <p:extLst>
+    <p:ext uri="{EFAFB233-063F-42B5-8137-9DF3F51BA10A}">
+      <p15:sldGuideLst xmlns:p15="http://schemas.microsoft.com/office/powerpoint/2012/main"/>
+    </p:ext>
+  </p:extLst>
 </p:presentation>
 </file>
 
@@ -130,25 +134,76 @@
       </p:grpSpPr>
       <p:sp>
         <p:nvSpPr>
-          <p:cNvPr id="2" name="Title 1"/>
-          <p:cNvSpPr>
-            <a:spLocks noGrp="1"/>
-          </p:cNvSpPr>
-          <p:nvPr>
-            <p:ph type="ctrTitle"/>
-          </p:nvPr>
+          <p:cNvPr id="7" name="Rectangle 6"/>
+          <p:cNvSpPr>
+            <a:spLocks noChangeAspect="1"/>
+          </p:cNvSpPr>
+          <p:nvPr/>
         </p:nvSpPr>
         <p:spPr>
           <a:xfrm>
-            <a:off x="1524000" y="1122363"/>
-            <a:ext cx="9144000" cy="2387600"/>
+            <a:off x="231140" y="243840"/>
+            <a:ext cx="11724640" cy="6377939"/>
+          </a:xfrm>
+          <a:prstGeom prst="rect">
+            <a:avLst/>
+          </a:prstGeom>
+          <a:solidFill>
+            <a:schemeClr val="bg1"/>
+          </a:solidFill>
+          <a:ln w="12700">
+            <a:solidFill>
+              <a:schemeClr val="tx1"/>
+            </a:solidFill>
+          </a:ln>
+        </p:spPr>
+        <p:style>
+          <a:lnRef idx="2">
+            <a:schemeClr val="accent1">
+              <a:shade val="50000"/>
+            </a:schemeClr>
+          </a:lnRef>
+          <a:fillRef idx="1">
+            <a:schemeClr val="accent1"/>
+          </a:fillRef>
+          <a:effectRef idx="0">
+            <a:schemeClr val="accent1"/>
+          </a:effectRef>
+          <a:fontRef idx="minor">
+            <a:schemeClr val="lt1"/>
+          </a:fontRef>
+        </p:style>
+      </p:sp>
+      <p:sp>
+        <p:nvSpPr>
+          <p:cNvPr id="2" name="Title 1"/>
+          <p:cNvSpPr>
+            <a:spLocks noGrp="1"/>
+          </p:cNvSpPr>
+          <p:nvPr>
+            <p:ph type="ctrTitle"/>
+          </p:nvPr>
+        </p:nvSpPr>
+        <p:spPr>
+          <a:xfrm>
+            <a:off x="1109980" y="882376"/>
+            <a:ext cx="9966960" cy="2926080"/>
           </a:xfrm>
         </p:spPr>
         <p:txBody>
-          <a:bodyPr anchor="b"/>
+          <a:bodyPr anchor="b">
+            <a:normAutofit/>
+          </a:bodyPr>
           <a:lstStyle>
             <a:lvl1pPr algn="ctr">
-              <a:defRPr sz="6000"/>
+              <a:lnSpc>
+                <a:spcPct val="85000"/>
+              </a:lnSpc>
+              <a:defRPr sz="7200" b="1" cap="all" baseline="0">
+                <a:solidFill>
+                  <a:schemeClr val="tx1"/>
+                </a:solidFill>
+              </a:defRPr>
             </a:lvl1pPr>
           </a:lstStyle>
           <a:p>
@@ -156,7 +211,7 @@
               <a:rPr lang="en-US" smtClean="0"/>
               <a:t>Click to edit Master title style</a:t>
             </a:r>
-            <a:endParaRPr lang="en-US"/>
+            <a:endParaRPr lang="en-US" dirty="0"/>
           </a:p>
         </p:txBody>
       </p:sp>
@@ -172,48 +227,54 @@
         </p:nvSpPr>
         <p:spPr>
           <a:xfrm>
-            <a:off x="1524000" y="3602038"/>
-            <a:ext cx="9144000" cy="1655762"/>
+            <a:off x="1709530" y="3869634"/>
+            <a:ext cx="8767860" cy="1388165"/>
           </a:xfrm>
         </p:spPr>
         <p:txBody>
-          <a:bodyPr/>
+          <a:bodyPr>
+            <a:normAutofit/>
+          </a:bodyPr>
           <a:lstStyle>
             <a:lvl1pPr marL="0" indent="0" algn="ctr">
               <a:buNone/>
-              <a:defRPr sz="2400"/>
+              <a:defRPr sz="2200">
+                <a:solidFill>
+                  <a:schemeClr val="tx1"/>
+                </a:solidFill>
+              </a:defRPr>
             </a:lvl1pPr>
             <a:lvl2pPr marL="457200" indent="0" algn="ctr">
               <a:buNone/>
-              <a:defRPr sz="2000"/>
+              <a:defRPr sz="2200"/>
             </a:lvl2pPr>
             <a:lvl3pPr marL="914400" indent="0" algn="ctr">
               <a:buNone/>
-              <a:defRPr sz="1800"/>
+              <a:defRPr sz="2200"/>
             </a:lvl3pPr>
             <a:lvl4pPr marL="1371600" indent="0" algn="ctr">
               <a:buNone/>
-              <a:defRPr sz="1600"/>
+              <a:defRPr sz="2000"/>
             </a:lvl4pPr>
             <a:lvl5pPr marL="1828800" indent="0" algn="ctr">
               <a:buNone/>
-              <a:defRPr sz="1600"/>
+              <a:defRPr sz="2000"/>
             </a:lvl5pPr>
             <a:lvl6pPr marL="2286000" indent="0" algn="ctr">
               <a:buNone/>
-              <a:defRPr sz="1600"/>
+              <a:defRPr sz="2000"/>
             </a:lvl6pPr>
             <a:lvl7pPr marL="2743200" indent="0" algn="ctr">
               <a:buNone/>
-              <a:defRPr sz="1600"/>
+              <a:defRPr sz="2000"/>
             </a:lvl7pPr>
             <a:lvl8pPr marL="3200400" indent="0" algn="ctr">
               <a:buNone/>
-              <a:defRPr sz="1600"/>
+              <a:defRPr sz="2000"/>
             </a:lvl8pPr>
             <a:lvl9pPr marL="3657600" indent="0" algn="ctr">
               <a:buNone/>
-              <a:defRPr sz="1600"/>
+              <a:defRPr sz="2000"/>
             </a:lvl9pPr>
           </a:lstStyle>
           <a:p>
@@ -221,7 +282,7 @@
               <a:rPr lang="en-US" smtClean="0"/>
               <a:t>Click to edit Master subtitle style</a:t>
             </a:r>
-            <a:endParaRPr lang="en-US"/>
+            <a:endParaRPr lang="en-US" dirty="0"/>
           </a:p>
         </p:txBody>
       </p:sp>
@@ -238,7 +299,15 @@
         <p:spPr/>
         <p:txBody>
           <a:bodyPr/>
-          <a:lstStyle/>
+          <a:lstStyle>
+            <a:lvl1pPr>
+              <a:defRPr>
+                <a:solidFill>
+                  <a:schemeClr val="tx1"/>
+                </a:solidFill>
+              </a:defRPr>
+            </a:lvl1pPr>
+          </a:lstStyle>
           <a:p>
             <a:fld id="{1051E915-BC91-4BD6-BC90-BCDFE094BF0D}" type="datetimeFigureOut">
               <a:rPr lang="en-US" smtClean="0"/>
@@ -261,7 +330,15 @@
         <p:spPr/>
         <p:txBody>
           <a:bodyPr/>
-          <a:lstStyle/>
+          <a:lstStyle>
+            <a:lvl1pPr>
+              <a:defRPr>
+                <a:solidFill>
+                  <a:schemeClr val="tx1"/>
+                </a:solidFill>
+              </a:defRPr>
+            </a:lvl1pPr>
+          </a:lstStyle>
           <a:p>
             <a:endParaRPr lang="en-US"/>
           </a:p>
@@ -280,7 +357,15 @@
         <p:spPr/>
         <p:txBody>
           <a:bodyPr/>
-          <a:lstStyle/>
+          <a:lstStyle>
+            <a:lvl1pPr>
+              <a:defRPr>
+                <a:solidFill>
+                  <a:schemeClr val="tx1"/>
+                </a:solidFill>
+              </a:defRPr>
+            </a:lvl1pPr>
+          </a:lstStyle>
           <a:p>
             <a:fld id="{3DB8769F-F084-49BA-91A4-9968DC25CDBF}" type="slidenum">
               <a:rPr lang="en-US" smtClean="0"/>
@@ -290,10 +375,45 @@
           </a:p>
         </p:txBody>
       </p:sp>
+      <p:cxnSp>
+        <p:nvCxnSpPr>
+          <p:cNvPr id="8" name="Straight Connector 7"/>
+          <p:cNvCxnSpPr/>
+          <p:nvPr/>
+        </p:nvCxnSpPr>
+        <p:spPr>
+          <a:xfrm>
+            <a:off x="1978660" y="3733800"/>
+            <a:ext cx="8229601" cy="0"/>
+          </a:xfrm>
+          <a:prstGeom prst="line">
+            <a:avLst/>
+          </a:prstGeom>
+          <a:ln>
+            <a:solidFill>
+              <a:schemeClr val="tx1"/>
+            </a:solidFill>
+          </a:ln>
+        </p:spPr>
+        <p:style>
+          <a:lnRef idx="1">
+            <a:schemeClr val="accent1"/>
+          </a:lnRef>
+          <a:fillRef idx="0">
+            <a:schemeClr val="accent1"/>
+          </a:fillRef>
+          <a:effectRef idx="0">
+            <a:schemeClr val="accent1"/>
+          </a:effectRef>
+          <a:fontRef idx="minor">
+            <a:schemeClr val="tx1"/>
+          </a:fontRef>
+        </p:style>
+      </p:cxnSp>
     </p:spTree>
     <p:extLst>
       <p:ext uri="{BB962C8B-B14F-4D97-AF65-F5344CB8AC3E}">
-        <p14:creationId xmlns:p14="http://schemas.microsoft.com/office/powerpoint/2010/main" val="1518378640"/>
+        <p14:creationId xmlns:p14="http://schemas.microsoft.com/office/powerpoint/2010/main" val="2798757172"/>
       </p:ext>
     </p:extLst>
   </p:cSld>
@@ -339,7 +459,7 @@
               <a:rPr lang="en-US" smtClean="0"/>
               <a:t>Click to edit Master title style</a:t>
             </a:r>
-            <a:endParaRPr lang="en-US"/>
+            <a:endParaRPr lang="en-US" dirty="0"/>
           </a:p>
         </p:txBody>
       </p:sp>
@@ -391,7 +511,7 @@
               <a:rPr lang="en-US" smtClean="0"/>
               <a:t>Fifth level</a:t>
             </a:r>
-            <a:endParaRPr lang="en-US"/>
+            <a:endParaRPr lang="en-US" dirty="0"/>
           </a:p>
         </p:txBody>
       </p:sp>
@@ -463,7 +583,7 @@
     </p:spTree>
     <p:extLst>
       <p:ext uri="{BB962C8B-B14F-4D97-AF65-F5344CB8AC3E}">
-        <p14:creationId xmlns:p14="http://schemas.microsoft.com/office/powerpoint/2010/main" val="2878751865"/>
+        <p14:creationId xmlns:p14="http://schemas.microsoft.com/office/powerpoint/2010/main" val="978574901"/>
       </p:ext>
     </p:extLst>
   </p:cSld>
@@ -502,8 +622,8 @@
         </p:nvSpPr>
         <p:spPr>
           <a:xfrm>
-            <a:off x="8724900" y="365125"/>
-            <a:ext cx="2628900" cy="5811838"/>
+            <a:off x="8724900" y="762000"/>
+            <a:ext cx="2324100" cy="5410200"/>
           </a:xfrm>
         </p:spPr>
         <p:txBody>
@@ -514,7 +634,7 @@
               <a:rPr lang="en-US" smtClean="0"/>
               <a:t>Click to edit Master title style</a:t>
             </a:r>
-            <a:endParaRPr lang="en-US"/>
+            <a:endParaRPr lang="en-US" dirty="0"/>
           </a:p>
         </p:txBody>
       </p:sp>
@@ -530,8 +650,8 @@
         </p:nvSpPr>
         <p:spPr>
           <a:xfrm>
-            <a:off x="838200" y="365125"/>
-            <a:ext cx="7734300" cy="5811838"/>
+            <a:off x="1143000" y="762000"/>
+            <a:ext cx="7429500" cy="5410200"/>
           </a:xfrm>
         </p:spPr>
         <p:txBody>
@@ -571,7 +691,7 @@
               <a:rPr lang="en-US" smtClean="0"/>
               <a:t>Fifth level</a:t>
             </a:r>
-            <a:endParaRPr lang="en-US"/>
+            <a:endParaRPr lang="en-US" dirty="0"/>
           </a:p>
         </p:txBody>
       </p:sp>
@@ -643,7 +763,7 @@
     </p:spTree>
     <p:extLst>
       <p:ext uri="{BB962C8B-B14F-4D97-AF65-F5344CB8AC3E}">
-        <p14:creationId xmlns:p14="http://schemas.microsoft.com/office/powerpoint/2010/main" val="1532925786"/>
+        <p14:creationId xmlns:p14="http://schemas.microsoft.com/office/powerpoint/2010/main" val="2120287734"/>
       </p:ext>
     </p:extLst>
   </p:cSld>
@@ -689,7 +809,7 @@
               <a:rPr lang="en-US" smtClean="0"/>
               <a:t>Click to edit Master title style</a:t>
             </a:r>
-            <a:endParaRPr lang="en-US"/>
+            <a:endParaRPr lang="en-US" dirty="0"/>
           </a:p>
         </p:txBody>
       </p:sp>
@@ -741,7 +861,7 @@
               <a:rPr lang="en-US" smtClean="0"/>
               <a:t>Fifth level</a:t>
             </a:r>
-            <a:endParaRPr lang="en-US"/>
+            <a:endParaRPr lang="en-US" dirty="0"/>
           </a:p>
         </p:txBody>
       </p:sp>
@@ -813,7 +933,7 @@
     </p:spTree>
     <p:extLst>
       <p:ext uri="{BB962C8B-B14F-4D97-AF65-F5344CB8AC3E}">
-        <p14:creationId xmlns:p14="http://schemas.microsoft.com/office/powerpoint/2010/main" val="2291617104"/>
+        <p14:creationId xmlns:p14="http://schemas.microsoft.com/office/powerpoint/2010/main" val="944775152"/>
       </p:ext>
     </p:extLst>
   </p:cSld>
@@ -852,15 +972,20 @@
         </p:nvSpPr>
         <p:spPr>
           <a:xfrm>
-            <a:off x="831850" y="1709738"/>
-            <a:ext cx="10515600" cy="2852737"/>
+            <a:off x="1106424" y="1173575"/>
+            <a:ext cx="9966960" cy="2926080"/>
           </a:xfrm>
         </p:spPr>
         <p:txBody>
-          <a:bodyPr anchor="b"/>
+          <a:bodyPr anchor="b">
+            <a:noAutofit/>
+          </a:bodyPr>
           <a:lstStyle>
-            <a:lvl1pPr>
-              <a:defRPr sz="6000"/>
+            <a:lvl1pPr algn="ctr">
+              <a:lnSpc>
+                <a:spcPct val="85000"/>
+              </a:lnSpc>
+              <a:defRPr sz="7200" b="0" cap="all" baseline="0"/>
             </a:lvl1pPr>
           </a:lstStyle>
           <a:p>
@@ -868,7 +993,7 @@
               <a:rPr lang="en-US" smtClean="0"/>
               <a:t>Click to edit Master title style</a:t>
             </a:r>
-            <a:endParaRPr lang="en-US"/>
+            <a:endParaRPr lang="en-US" dirty="0"/>
           </a:p>
         </p:txBody>
       </p:sp>
@@ -884,26 +1009,26 @@
         </p:nvSpPr>
         <p:spPr>
           <a:xfrm>
-            <a:off x="831850" y="4589463"/>
-            <a:ext cx="10515600" cy="1500187"/>
+            <a:off x="1709928" y="4154520"/>
+            <a:ext cx="8769096" cy="1363806"/>
           </a:xfrm>
         </p:spPr>
         <p:txBody>
-          <a:bodyPr/>
+          <a:bodyPr anchor="t">
+            <a:normAutofit/>
+          </a:bodyPr>
           <a:lstStyle>
-            <a:lvl1pPr marL="0" indent="0">
-              <a:buNone/>
-              <a:defRPr sz="2400">
+            <a:lvl1pPr marL="0" indent="0" algn="ctr">
+              <a:buNone/>
+              <a:defRPr sz="2200">
                 <a:solidFill>
-                  <a:schemeClr val="tx1">
-                    <a:tint val="75000"/>
-                  </a:schemeClr>
+                  <a:schemeClr val="tx1"/>
                 </a:solidFill>
               </a:defRPr>
             </a:lvl1pPr>
             <a:lvl2pPr marL="457200" indent="0">
               <a:buNone/>
-              <a:defRPr sz="2000">
+              <a:defRPr sz="1800">
                 <a:solidFill>
                   <a:schemeClr val="tx1">
                     <a:tint val="75000"/>
@@ -913,7 +1038,7 @@
             </a:lvl2pPr>
             <a:lvl3pPr marL="914400" indent="0">
               <a:buNone/>
-              <a:defRPr sz="1800">
+              <a:defRPr sz="1600">
                 <a:solidFill>
                   <a:schemeClr val="tx1">
                     <a:tint val="75000"/>
@@ -923,7 +1048,7 @@
             </a:lvl3pPr>
             <a:lvl4pPr marL="1371600" indent="0">
               <a:buNone/>
-              <a:defRPr sz="1600">
+              <a:defRPr sz="1400">
                 <a:solidFill>
                   <a:schemeClr val="tx1">
                     <a:tint val="75000"/>
@@ -933,7 +1058,7 @@
             </a:lvl4pPr>
             <a:lvl5pPr marL="1828800" indent="0">
               <a:buNone/>
-              <a:defRPr sz="1600">
+              <a:defRPr sz="1400">
                 <a:solidFill>
                   <a:schemeClr val="tx1">
                     <a:tint val="75000"/>
@@ -943,7 +1068,7 @@
             </a:lvl5pPr>
             <a:lvl6pPr marL="2286000" indent="0">
               <a:buNone/>
-              <a:defRPr sz="1600">
+              <a:defRPr sz="1400">
                 <a:solidFill>
                   <a:schemeClr val="tx1">
                     <a:tint val="75000"/>
@@ -953,7 +1078,7 @@
             </a:lvl6pPr>
             <a:lvl7pPr marL="2743200" indent="0">
               <a:buNone/>
-              <a:defRPr sz="1600">
+              <a:defRPr sz="1400">
                 <a:solidFill>
                   <a:schemeClr val="tx1">
                     <a:tint val="75000"/>
@@ -963,7 +1088,7 @@
             </a:lvl7pPr>
             <a:lvl8pPr marL="3200400" indent="0">
               <a:buNone/>
-              <a:defRPr sz="1600">
+              <a:defRPr sz="1400">
                 <a:solidFill>
                   <a:schemeClr val="tx1">
                     <a:tint val="75000"/>
@@ -973,7 +1098,7 @@
             </a:lvl8pPr>
             <a:lvl9pPr marL="3657600" indent="0">
               <a:buNone/>
-              <a:defRPr sz="1600">
+              <a:defRPr sz="1400">
                 <a:solidFill>
                   <a:schemeClr val="tx1">
                     <a:tint val="75000"/>
@@ -1056,10 +1181,45 @@
           </a:p>
         </p:txBody>
       </p:sp>
+      <p:cxnSp>
+        <p:nvCxnSpPr>
+          <p:cNvPr id="7" name="Straight Connector 6"/>
+          <p:cNvCxnSpPr/>
+          <p:nvPr/>
+        </p:nvCxnSpPr>
+        <p:spPr>
+          <a:xfrm>
+            <a:off x="1981200" y="4020408"/>
+            <a:ext cx="8229601" cy="0"/>
+          </a:xfrm>
+          <a:prstGeom prst="line">
+            <a:avLst/>
+          </a:prstGeom>
+          <a:ln>
+            <a:solidFill>
+              <a:schemeClr val="tx1"/>
+            </a:solidFill>
+          </a:ln>
+        </p:spPr>
+        <p:style>
+          <a:lnRef idx="1">
+            <a:schemeClr val="accent1"/>
+          </a:lnRef>
+          <a:fillRef idx="0">
+            <a:schemeClr val="accent1"/>
+          </a:fillRef>
+          <a:effectRef idx="0">
+            <a:schemeClr val="accent1"/>
+          </a:effectRef>
+          <a:fontRef idx="minor">
+            <a:schemeClr val="tx1"/>
+          </a:fontRef>
+        </p:style>
+      </p:cxnSp>
     </p:spTree>
     <p:extLst>
       <p:ext uri="{BB962C8B-B14F-4D97-AF65-F5344CB8AC3E}">
-        <p14:creationId xmlns:p14="http://schemas.microsoft.com/office/powerpoint/2010/main" val="119400726"/>
+        <p14:creationId xmlns:p14="http://schemas.microsoft.com/office/powerpoint/2010/main" val="2127241903"/>
       </p:ext>
     </p:extLst>
   </p:cSld>
@@ -1088,7 +1248,7 @@
       </p:grpSpPr>
       <p:sp>
         <p:nvSpPr>
-          <p:cNvPr id="2" name="Title 1"/>
+          <p:cNvPr id="8" name="Title 7"/>
           <p:cNvSpPr>
             <a:spLocks noGrp="1"/>
           </p:cNvSpPr>
@@ -1105,7 +1265,7 @@
               <a:rPr lang="en-US" smtClean="0"/>
               <a:t>Click to edit Master title style</a:t>
             </a:r>
-            <a:endParaRPr lang="en-US"/>
+            <a:endParaRPr lang="en-US" dirty="0"/>
           </a:p>
         </p:txBody>
       </p:sp>
@@ -1121,13 +1281,41 @@
         </p:nvSpPr>
         <p:spPr>
           <a:xfrm>
-            <a:off x="838200" y="1825625"/>
-            <a:ext cx="5181600" cy="4351338"/>
+            <a:off x="1143000" y="2057399"/>
+            <a:ext cx="4754880" cy="4023360"/>
           </a:xfrm>
         </p:spPr>
         <p:txBody>
           <a:bodyPr/>
-          <a:lstStyle/>
+          <a:lstStyle>
+            <a:lvl1pPr>
+              <a:defRPr sz="2200"/>
+            </a:lvl1pPr>
+            <a:lvl2pPr>
+              <a:defRPr sz="2000"/>
+            </a:lvl2pPr>
+            <a:lvl3pPr>
+              <a:defRPr sz="1800"/>
+            </a:lvl3pPr>
+            <a:lvl4pPr>
+              <a:defRPr sz="1600"/>
+            </a:lvl4pPr>
+            <a:lvl5pPr>
+              <a:defRPr sz="1600"/>
+            </a:lvl5pPr>
+            <a:lvl6pPr>
+              <a:defRPr sz="1600"/>
+            </a:lvl6pPr>
+            <a:lvl7pPr>
+              <a:defRPr sz="1600"/>
+            </a:lvl7pPr>
+            <a:lvl8pPr>
+              <a:defRPr sz="1600"/>
+            </a:lvl8pPr>
+            <a:lvl9pPr>
+              <a:defRPr sz="1600"/>
+            </a:lvl9pPr>
+          </a:lstStyle>
           <a:p>
             <a:pPr lvl="0"/>
             <a:r>
@@ -1162,7 +1350,7 @@
               <a:rPr lang="en-US" smtClean="0"/>
               <a:t>Fifth level</a:t>
             </a:r>
-            <a:endParaRPr lang="en-US"/>
+            <a:endParaRPr lang="en-US" dirty="0"/>
           </a:p>
         </p:txBody>
       </p:sp>
@@ -1178,13 +1366,41 @@
         </p:nvSpPr>
         <p:spPr>
           <a:xfrm>
-            <a:off x="6172200" y="1825625"/>
-            <a:ext cx="5181600" cy="4351338"/>
+            <a:off x="6267612" y="2057400"/>
+            <a:ext cx="4754880" cy="4023360"/>
           </a:xfrm>
         </p:spPr>
         <p:txBody>
           <a:bodyPr/>
-          <a:lstStyle/>
+          <a:lstStyle>
+            <a:lvl1pPr>
+              <a:defRPr sz="2200"/>
+            </a:lvl1pPr>
+            <a:lvl2pPr>
+              <a:defRPr sz="2000"/>
+            </a:lvl2pPr>
+            <a:lvl3pPr>
+              <a:defRPr sz="1800"/>
+            </a:lvl3pPr>
+            <a:lvl4pPr>
+              <a:defRPr sz="1600"/>
+            </a:lvl4pPr>
+            <a:lvl5pPr>
+              <a:defRPr sz="1600"/>
+            </a:lvl5pPr>
+            <a:lvl6pPr>
+              <a:defRPr sz="1600"/>
+            </a:lvl6pPr>
+            <a:lvl7pPr>
+              <a:defRPr sz="1600"/>
+            </a:lvl7pPr>
+            <a:lvl8pPr>
+              <a:defRPr sz="1600"/>
+            </a:lvl8pPr>
+            <a:lvl9pPr>
+              <a:defRPr sz="1600"/>
+            </a:lvl9pPr>
+          </a:lstStyle>
           <a:p>
             <a:pPr lvl="0"/>
             <a:r>
@@ -1219,7 +1435,7 @@
               <a:rPr lang="en-US" smtClean="0"/>
               <a:t>Fifth level</a:t>
             </a:r>
-            <a:endParaRPr lang="en-US"/>
+            <a:endParaRPr lang="en-US" dirty="0"/>
           </a:p>
         </p:txBody>
       </p:sp>
@@ -1291,7 +1507,7 @@
     </p:spTree>
     <p:extLst>
       <p:ext uri="{BB962C8B-B14F-4D97-AF65-F5344CB8AC3E}">
-        <p14:creationId xmlns:p14="http://schemas.microsoft.com/office/powerpoint/2010/main" val="3736318539"/>
+        <p14:creationId xmlns:p14="http://schemas.microsoft.com/office/powerpoint/2010/main" val="3060464963"/>
       </p:ext>
     </p:extLst>
   </p:cSld>
@@ -1320,52 +1536,50 @@
       </p:grpSpPr>
       <p:sp>
         <p:nvSpPr>
-          <p:cNvPr id="2" name="Title 1"/>
+          <p:cNvPr id="10" name="Title 9"/>
           <p:cNvSpPr>
             <a:spLocks noGrp="1"/>
           </p:cNvSpPr>
           <p:nvPr>
             <p:ph type="title"/>
+          </p:nvPr>
+        </p:nvSpPr>
+        <p:spPr/>
+        <p:txBody>
+          <a:bodyPr/>
+          <a:lstStyle/>
+          <a:p>
+            <a:r>
+              <a:rPr lang="en-US" smtClean="0"/>
+              <a:t>Click to edit Master title style</a:t>
+            </a:r>
+            <a:endParaRPr lang="en-US" dirty="0"/>
+          </a:p>
+        </p:txBody>
+      </p:sp>
+      <p:sp>
+        <p:nvSpPr>
+          <p:cNvPr id="3" name="Text Placeholder 2"/>
+          <p:cNvSpPr>
+            <a:spLocks noGrp="1"/>
+          </p:cNvSpPr>
+          <p:nvPr>
+            <p:ph type="body" idx="1"/>
           </p:nvPr>
         </p:nvSpPr>
         <p:spPr>
           <a:xfrm>
-            <a:off x="839788" y="365125"/>
-            <a:ext cx="10515600" cy="1325563"/>
+            <a:off x="1143000" y="2001511"/>
+            <a:ext cx="4754880" cy="777240"/>
           </a:xfrm>
         </p:spPr>
         <p:txBody>
-          <a:bodyPr/>
-          <a:lstStyle/>
-          <a:p>
-            <a:r>
-              <a:rPr lang="en-US" smtClean="0"/>
-              <a:t>Click to edit Master title style</a:t>
-            </a:r>
-            <a:endParaRPr lang="en-US"/>
-          </a:p>
-        </p:txBody>
-      </p:sp>
-      <p:sp>
-        <p:nvSpPr>
-          <p:cNvPr id="3" name="Text Placeholder 2"/>
-          <p:cNvSpPr>
-            <a:spLocks noGrp="1"/>
-          </p:cNvSpPr>
-          <p:nvPr>
-            <p:ph type="body" idx="1"/>
-          </p:nvPr>
-        </p:nvSpPr>
-        <p:spPr>
-          <a:xfrm>
-            <a:off x="839788" y="1681163"/>
-            <a:ext cx="5157787" cy="823912"/>
-          </a:xfrm>
-        </p:spPr>
-        <p:txBody>
-          <a:bodyPr anchor="b"/>
+          <a:bodyPr anchor="ctr"/>
           <a:lstStyle>
             <a:lvl1pPr marL="0" indent="0">
+              <a:spcBef>
+                <a:spcPts val="0"/>
+              </a:spcBef>
               <a:buNone/>
               <a:defRPr sz="2400" b="1"/>
             </a:lvl1pPr>
@@ -1423,13 +1637,41 @@
         </p:nvSpPr>
         <p:spPr>
           <a:xfrm>
-            <a:off x="839788" y="2505075"/>
-            <a:ext cx="5157787" cy="3684588"/>
+            <a:off x="1143000" y="2721483"/>
+            <a:ext cx="4754880" cy="3383280"/>
           </a:xfrm>
         </p:spPr>
         <p:txBody>
           <a:bodyPr/>
-          <a:lstStyle/>
+          <a:lstStyle>
+            <a:lvl1pPr>
+              <a:defRPr sz="2200"/>
+            </a:lvl1pPr>
+            <a:lvl2pPr>
+              <a:defRPr sz="2000"/>
+            </a:lvl2pPr>
+            <a:lvl3pPr>
+              <a:defRPr sz="1800"/>
+            </a:lvl3pPr>
+            <a:lvl4pPr>
+              <a:defRPr sz="1600"/>
+            </a:lvl4pPr>
+            <a:lvl5pPr>
+              <a:defRPr sz="1600"/>
+            </a:lvl5pPr>
+            <a:lvl6pPr>
+              <a:defRPr sz="1600"/>
+            </a:lvl6pPr>
+            <a:lvl7pPr>
+              <a:defRPr sz="1600"/>
+            </a:lvl7pPr>
+            <a:lvl8pPr>
+              <a:defRPr sz="1600"/>
+            </a:lvl8pPr>
+            <a:lvl9pPr>
+              <a:defRPr sz="1600"/>
+            </a:lvl9pPr>
+          </a:lstStyle>
           <a:p>
             <a:pPr lvl="0"/>
             <a:r>
@@ -1464,7 +1706,7 @@
               <a:rPr lang="en-US" smtClean="0"/>
               <a:t>Fifth level</a:t>
             </a:r>
-            <a:endParaRPr lang="en-US"/>
+            <a:endParaRPr lang="en-US" dirty="0"/>
           </a:p>
         </p:txBody>
       </p:sp>
@@ -1480,14 +1722,17 @@
         </p:nvSpPr>
         <p:spPr>
           <a:xfrm>
-            <a:off x="6172200" y="1681163"/>
-            <a:ext cx="5183188" cy="823912"/>
+            <a:off x="6269173" y="1999032"/>
+            <a:ext cx="4754880" cy="777240"/>
           </a:xfrm>
         </p:spPr>
         <p:txBody>
-          <a:bodyPr anchor="b"/>
+          <a:bodyPr anchor="ctr"/>
           <a:lstStyle>
             <a:lvl1pPr marL="0" indent="0">
+              <a:spcBef>
+                <a:spcPts val="0"/>
+              </a:spcBef>
               <a:buNone/>
               <a:defRPr sz="2400" b="1"/>
             </a:lvl1pPr>
@@ -1545,13 +1790,41 @@
         </p:nvSpPr>
         <p:spPr>
           <a:xfrm>
-            <a:off x="6172200" y="2505075"/>
-            <a:ext cx="5183188" cy="3684588"/>
+            <a:off x="6269173" y="2719322"/>
+            <a:ext cx="4754880" cy="3383280"/>
           </a:xfrm>
         </p:spPr>
         <p:txBody>
           <a:bodyPr/>
-          <a:lstStyle/>
+          <a:lstStyle>
+            <a:lvl1pPr>
+              <a:defRPr sz="2200"/>
+            </a:lvl1pPr>
+            <a:lvl2pPr>
+              <a:defRPr sz="2000"/>
+            </a:lvl2pPr>
+            <a:lvl3pPr>
+              <a:defRPr sz="1800"/>
+            </a:lvl3pPr>
+            <a:lvl4pPr>
+              <a:defRPr sz="1600"/>
+            </a:lvl4pPr>
+            <a:lvl5pPr>
+              <a:defRPr sz="1600"/>
+            </a:lvl5pPr>
+            <a:lvl6pPr>
+              <a:defRPr sz="1600"/>
+            </a:lvl6pPr>
+            <a:lvl7pPr>
+              <a:defRPr sz="1600"/>
+            </a:lvl7pPr>
+            <a:lvl8pPr>
+              <a:defRPr sz="1600"/>
+            </a:lvl8pPr>
+            <a:lvl9pPr>
+              <a:defRPr sz="1600"/>
+            </a:lvl9pPr>
+          </a:lstStyle>
           <a:p>
             <a:pPr lvl="0"/>
             <a:r>
@@ -1586,7 +1859,7 @@
               <a:rPr lang="en-US" smtClean="0"/>
               <a:t>Fifth level</a:t>
             </a:r>
-            <a:endParaRPr lang="en-US"/>
+            <a:endParaRPr lang="en-US" dirty="0"/>
           </a:p>
         </p:txBody>
       </p:sp>
@@ -1658,7 +1931,7 @@
     </p:spTree>
     <p:extLst>
       <p:ext uri="{BB962C8B-B14F-4D97-AF65-F5344CB8AC3E}">
-        <p14:creationId xmlns:p14="http://schemas.microsoft.com/office/powerpoint/2010/main" val="1894376184"/>
+        <p14:creationId xmlns:p14="http://schemas.microsoft.com/office/powerpoint/2010/main" val="2981609317"/>
       </p:ext>
     </p:extLst>
   </p:cSld>
@@ -1704,7 +1977,7 @@
               <a:rPr lang="en-US" smtClean="0"/>
               <a:t>Click to edit Master title style</a:t>
             </a:r>
-            <a:endParaRPr lang="en-US"/>
+            <a:endParaRPr lang="en-US" dirty="0"/>
           </a:p>
         </p:txBody>
       </p:sp>
@@ -1776,7 +2049,7 @@
     </p:spTree>
     <p:extLst>
       <p:ext uri="{BB962C8B-B14F-4D97-AF65-F5344CB8AC3E}">
-        <p14:creationId xmlns:p14="http://schemas.microsoft.com/office/powerpoint/2010/main" val="3250628595"/>
+        <p14:creationId xmlns:p14="http://schemas.microsoft.com/office/powerpoint/2010/main" val="3777798320"/>
       </p:ext>
     </p:extLst>
   </p:cSld>
@@ -1871,7 +2144,7 @@
     </p:spTree>
     <p:extLst>
       <p:ext uri="{BB962C8B-B14F-4D97-AF65-F5344CB8AC3E}">
-        <p14:creationId xmlns:p14="http://schemas.microsoft.com/office/powerpoint/2010/main" val="1619701567"/>
+        <p14:creationId xmlns:p14="http://schemas.microsoft.com/office/powerpoint/2010/main" val="2546855251"/>
       </p:ext>
     </p:extLst>
   </p:cSld>
@@ -1910,15 +2183,20 @@
         </p:nvSpPr>
         <p:spPr>
           <a:xfrm>
-            <a:off x="839788" y="457200"/>
-            <a:ext cx="3932237" cy="1600200"/>
+            <a:off x="1143000" y="1097280"/>
+            <a:ext cx="3931920" cy="1737360"/>
           </a:xfrm>
         </p:spPr>
         <p:txBody>
-          <a:bodyPr anchor="b"/>
+          <a:bodyPr anchor="b">
+            <a:noAutofit/>
+          </a:bodyPr>
           <a:lstStyle>
             <a:lvl1pPr>
-              <a:defRPr sz="3200"/>
+              <a:lnSpc>
+                <a:spcPct val="90000"/>
+              </a:lnSpc>
+              <a:defRPr sz="4000" b="0"/>
             </a:lvl1pPr>
           </a:lstStyle>
           <a:p>
@@ -1926,7 +2204,7 @@
               <a:rPr lang="en-US" smtClean="0"/>
               <a:t>Click to edit Master title style</a:t>
             </a:r>
-            <a:endParaRPr lang="en-US"/>
+            <a:endParaRPr lang="en-US" dirty="0"/>
           </a:p>
         </p:txBody>
       </p:sp>
@@ -1942,8 +2220,8 @@
         </p:nvSpPr>
         <p:spPr>
           <a:xfrm>
-            <a:off x="5183188" y="987425"/>
-            <a:ext cx="6172200" cy="4873625"/>
+            <a:off x="5852159" y="1097280"/>
+            <a:ext cx="5212080" cy="4663440"/>
           </a:xfrm>
         </p:spPr>
         <p:txBody>
@@ -2011,7 +2289,7 @@
               <a:rPr lang="en-US" smtClean="0"/>
               <a:t>Fifth level</a:t>
             </a:r>
-            <a:endParaRPr lang="en-US"/>
+            <a:endParaRPr lang="en-US" dirty="0"/>
           </a:p>
         </p:txBody>
       </p:sp>
@@ -2027,48 +2305,56 @@
         </p:nvSpPr>
         <p:spPr>
           <a:xfrm>
-            <a:off x="839788" y="2057400"/>
-            <a:ext cx="3932237" cy="3811588"/>
+            <a:off x="1143000" y="2834640"/>
+            <a:ext cx="3931920" cy="3017520"/>
           </a:xfrm>
         </p:spPr>
         <p:txBody>
-          <a:bodyPr/>
+          <a:bodyPr>
+            <a:normAutofit/>
+          </a:bodyPr>
           <a:lstStyle>
             <a:lvl1pPr marL="0" indent="0">
-              <a:buNone/>
-              <a:defRPr sz="1600"/>
+              <a:lnSpc>
+                <a:spcPct val="100000"/>
+              </a:lnSpc>
+              <a:spcBef>
+                <a:spcPts val="1000"/>
+              </a:spcBef>
+              <a:buNone/>
+              <a:defRPr sz="1700"/>
             </a:lvl1pPr>
             <a:lvl2pPr marL="457200" indent="0">
               <a:buNone/>
-              <a:defRPr sz="1400"/>
+              <a:defRPr sz="1200"/>
             </a:lvl2pPr>
             <a:lvl3pPr marL="914400" indent="0">
               <a:buNone/>
-              <a:defRPr sz="1200"/>
+              <a:defRPr sz="1000"/>
             </a:lvl3pPr>
             <a:lvl4pPr marL="1371600" indent="0">
               <a:buNone/>
-              <a:defRPr sz="1000"/>
+              <a:defRPr sz="900"/>
             </a:lvl4pPr>
             <a:lvl5pPr marL="1828800" indent="0">
               <a:buNone/>
-              <a:defRPr sz="1000"/>
+              <a:defRPr sz="900"/>
             </a:lvl5pPr>
             <a:lvl6pPr marL="2286000" indent="0">
               <a:buNone/>
-              <a:defRPr sz="1000"/>
+              <a:defRPr sz="900"/>
             </a:lvl6pPr>
             <a:lvl7pPr marL="2743200" indent="0">
               <a:buNone/>
-              <a:defRPr sz="1000"/>
+              <a:defRPr sz="900"/>
             </a:lvl7pPr>
             <a:lvl8pPr marL="3200400" indent="0">
               <a:buNone/>
-              <a:defRPr sz="1000"/>
+              <a:defRPr sz="900"/>
             </a:lvl8pPr>
             <a:lvl9pPr marL="3657600" indent="0">
               <a:buNone/>
-              <a:defRPr sz="1000"/>
+              <a:defRPr sz="900"/>
             </a:lvl9pPr>
           </a:lstStyle>
           <a:p>
@@ -2148,7 +2434,7 @@
     </p:spTree>
     <p:extLst>
       <p:ext uri="{BB962C8B-B14F-4D97-AF65-F5344CB8AC3E}">
-        <p14:creationId xmlns:p14="http://schemas.microsoft.com/office/powerpoint/2010/main" val="3482634220"/>
+        <p14:creationId xmlns:p14="http://schemas.microsoft.com/office/powerpoint/2010/main" val="1279675980"/>
       </p:ext>
     </p:extLst>
   </p:cSld>
@@ -2187,15 +2473,20 @@
         </p:nvSpPr>
         <p:spPr>
           <a:xfrm>
-            <a:off x="839788" y="457200"/>
-            <a:ext cx="3932237" cy="1600200"/>
+            <a:off x="1143000" y="1097280"/>
+            <a:ext cx="3931920" cy="1737360"/>
           </a:xfrm>
         </p:spPr>
         <p:txBody>
-          <a:bodyPr anchor="b"/>
+          <a:bodyPr anchor="b">
+            <a:noAutofit/>
+          </a:bodyPr>
           <a:lstStyle>
             <a:lvl1pPr>
-              <a:defRPr sz="3200"/>
+              <a:lnSpc>
+                <a:spcPct val="90000"/>
+              </a:lnSpc>
+              <a:defRPr sz="4000" b="0"/>
             </a:lvl1pPr>
           </a:lstStyle>
           <a:p>
@@ -2203,7 +2494,7 @@
               <a:rPr lang="en-US" smtClean="0"/>
               <a:t>Click to edit Master title style</a:t>
             </a:r>
-            <a:endParaRPr lang="en-US"/>
+            <a:endParaRPr lang="en-US" dirty="0"/>
           </a:p>
         </p:txBody>
       </p:sp>
@@ -2211,7 +2502,7 @@
         <p:nvSpPr>
           <p:cNvPr id="3" name="Picture Placeholder 2"/>
           <p:cNvSpPr>
-            <a:spLocks noGrp="1"/>
+            <a:spLocks noGrp="1" noChangeAspect="1"/>
           </p:cNvSpPr>
           <p:nvPr>
             <p:ph type="pic" idx="1"/>
@@ -2219,16 +2510,18 @@
         </p:nvSpPr>
         <p:spPr>
           <a:xfrm>
-            <a:off x="5183188" y="987425"/>
-            <a:ext cx="6172200" cy="4873625"/>
+            <a:off x="5413248" y="1069847"/>
+            <a:ext cx="6099048" cy="4800600"/>
           </a:xfrm>
         </p:spPr>
         <p:txBody>
-          <a:bodyPr/>
+          <a:bodyPr lIns="274320" tIns="182880" anchor="t">
+            <a:normAutofit/>
+          </a:bodyPr>
           <a:lstStyle>
             <a:lvl1pPr marL="0" indent="0">
               <a:buNone/>
-              <a:defRPr sz="3200"/>
+              <a:defRPr sz="2800"/>
             </a:lvl1pPr>
             <a:lvl2pPr marL="457200" indent="0">
               <a:buNone/>
@@ -2264,7 +2557,11 @@
             </a:lvl9pPr>
           </a:lstStyle>
           <a:p>
-            <a:endParaRPr lang="en-US"/>
+            <a:r>
+              <a:rPr lang="en-US" smtClean="0"/>
+              <a:t>Click icon to add picture</a:t>
+            </a:r>
+            <a:endParaRPr lang="en-US" dirty="0"/>
           </a:p>
         </p:txBody>
       </p:sp>
@@ -2280,48 +2577,56 @@
         </p:nvSpPr>
         <p:spPr>
           <a:xfrm>
-            <a:off x="839788" y="2057400"/>
-            <a:ext cx="3932237" cy="3811588"/>
+            <a:off x="1143000" y="2834640"/>
+            <a:ext cx="3931920" cy="2880360"/>
           </a:xfrm>
         </p:spPr>
         <p:txBody>
-          <a:bodyPr/>
+          <a:bodyPr>
+            <a:normAutofit/>
+          </a:bodyPr>
           <a:lstStyle>
             <a:lvl1pPr marL="0" indent="0">
-              <a:buNone/>
-              <a:defRPr sz="1600"/>
+              <a:lnSpc>
+                <a:spcPct val="100000"/>
+              </a:lnSpc>
+              <a:spcBef>
+                <a:spcPts val="1000"/>
+              </a:spcBef>
+              <a:buNone/>
+              <a:defRPr sz="1700"/>
             </a:lvl1pPr>
             <a:lvl2pPr marL="457200" indent="0">
               <a:buNone/>
-              <a:defRPr sz="1400"/>
+              <a:defRPr sz="1200"/>
             </a:lvl2pPr>
             <a:lvl3pPr marL="914400" indent="0">
               <a:buNone/>
-              <a:defRPr sz="1200"/>
+              <a:defRPr sz="1000"/>
             </a:lvl3pPr>
             <a:lvl4pPr marL="1371600" indent="0">
               <a:buNone/>
-              <a:defRPr sz="1000"/>
+              <a:defRPr sz="900"/>
             </a:lvl4pPr>
             <a:lvl5pPr marL="1828800" indent="0">
               <a:buNone/>
-              <a:defRPr sz="1000"/>
+              <a:defRPr sz="900"/>
             </a:lvl5pPr>
             <a:lvl6pPr marL="2286000" indent="0">
               <a:buNone/>
-              <a:defRPr sz="1000"/>
+              <a:defRPr sz="900"/>
             </a:lvl6pPr>
             <a:lvl7pPr marL="2743200" indent="0">
               <a:buNone/>
-              <a:defRPr sz="1000"/>
+              <a:defRPr sz="900"/>
             </a:lvl7pPr>
             <a:lvl8pPr marL="3200400" indent="0">
               <a:buNone/>
-              <a:defRPr sz="1000"/>
+              <a:defRPr sz="900"/>
             </a:lvl8pPr>
             <a:lvl9pPr marL="3657600" indent="0">
               <a:buNone/>
-              <a:defRPr sz="1000"/>
+              <a:defRPr sz="900"/>
             </a:lvl9pPr>
           </a:lstStyle>
           <a:p>
@@ -2401,7 +2706,7 @@
     </p:spTree>
     <p:extLst>
       <p:ext uri="{BB962C8B-B14F-4D97-AF65-F5344CB8AC3E}">
-        <p14:creationId xmlns:p14="http://schemas.microsoft.com/office/powerpoint/2010/main" val="1020306388"/>
+        <p14:creationId xmlns:p14="http://schemas.microsoft.com/office/powerpoint/2010/main" val="1532881817"/>
       </p:ext>
     </p:extLst>
   </p:cSld>
@@ -2435,18 +2740,60 @@
       </p:grpSpPr>
       <p:sp>
         <p:nvSpPr>
-          <p:cNvPr id="2" name="Title Placeholder 1"/>
-          <p:cNvSpPr>
-            <a:spLocks noGrp="1"/>
-          </p:cNvSpPr>
-          <p:nvPr>
-            <p:ph type="title"/>
-          </p:nvPr>
+          <p:cNvPr id="7" name="Rectangle 6"/>
+          <p:cNvSpPr>
+            <a:spLocks noChangeAspect="1"/>
+          </p:cNvSpPr>
+          <p:nvPr/>
         </p:nvSpPr>
         <p:spPr>
           <a:xfrm>
-            <a:off x="838200" y="365125"/>
-            <a:ext cx="10515600" cy="1325563"/>
+            <a:off x="231140" y="243840"/>
+            <a:ext cx="11724640" cy="6377939"/>
+          </a:xfrm>
+          <a:prstGeom prst="rect">
+            <a:avLst/>
+          </a:prstGeom>
+          <a:solidFill>
+            <a:schemeClr val="bg1"/>
+          </a:solidFill>
+          <a:ln w="12700">
+            <a:solidFill>
+              <a:schemeClr val="tx1"/>
+            </a:solidFill>
+          </a:ln>
+        </p:spPr>
+        <p:style>
+          <a:lnRef idx="2">
+            <a:schemeClr val="accent1">
+              <a:shade val="50000"/>
+            </a:schemeClr>
+          </a:lnRef>
+          <a:fillRef idx="1">
+            <a:schemeClr val="accent1"/>
+          </a:fillRef>
+          <a:effectRef idx="0">
+            <a:schemeClr val="accent1"/>
+          </a:effectRef>
+          <a:fontRef idx="minor">
+            <a:schemeClr val="lt1"/>
+          </a:fontRef>
+        </p:style>
+      </p:sp>
+      <p:sp>
+        <p:nvSpPr>
+          <p:cNvPr id="2" name="Title Placeholder 1"/>
+          <p:cNvSpPr>
+            <a:spLocks noGrp="1"/>
+          </p:cNvSpPr>
+          <p:nvPr>
+            <p:ph type="title"/>
+          </p:nvPr>
+        </p:nvSpPr>
+        <p:spPr>
+          <a:xfrm>
+            <a:off x="1143000" y="609600"/>
+            <a:ext cx="9875520" cy="1356360"/>
           </a:xfrm>
           <a:prstGeom prst="rect">
             <a:avLst/>
@@ -2462,7 +2809,7 @@
               <a:rPr lang="en-US" smtClean="0"/>
               <a:t>Click to edit Master title style</a:t>
             </a:r>
-            <a:endParaRPr lang="en-US"/>
+            <a:endParaRPr lang="en-US" dirty="0"/>
           </a:p>
         </p:txBody>
       </p:sp>
@@ -2478,8 +2825,8 @@
         </p:nvSpPr>
         <p:spPr>
           <a:xfrm>
-            <a:off x="838200" y="1825625"/>
-            <a:ext cx="10515600" cy="4351338"/>
+            <a:off x="1143000" y="2057400"/>
+            <a:ext cx="9872871" cy="4038600"/>
           </a:xfrm>
           <a:prstGeom prst="rect">
             <a:avLst/>
@@ -2524,7 +2871,7 @@
               <a:rPr lang="en-US" smtClean="0"/>
               <a:t>Fifth level</a:t>
             </a:r>
-            <a:endParaRPr lang="en-US"/>
+            <a:endParaRPr lang="en-US" dirty="0"/>
           </a:p>
         </p:txBody>
       </p:sp>
@@ -2540,8 +2887,8 @@
         </p:nvSpPr>
         <p:spPr>
           <a:xfrm>
-            <a:off x="838200" y="6356350"/>
-            <a:ext cx="2743200" cy="365125"/>
+            <a:off x="1142996" y="6223828"/>
+            <a:ext cx="2329074" cy="365125"/>
           </a:xfrm>
           <a:prstGeom prst="rect">
             <a:avLst/>
@@ -2553,9 +2900,7 @@
             <a:lvl1pPr algn="l">
               <a:defRPr sz="1200">
                 <a:solidFill>
-                  <a:schemeClr val="tx1">
-                    <a:tint val="75000"/>
-                  </a:schemeClr>
+                  <a:schemeClr val="tx1"/>
                 </a:solidFill>
               </a:defRPr>
             </a:lvl1pPr>
@@ -2581,8 +2926,8 @@
         </p:nvSpPr>
         <p:spPr>
           <a:xfrm>
-            <a:off x="4038600" y="6356350"/>
-            <a:ext cx="4114800" cy="365125"/>
+            <a:off x="3949148" y="6223828"/>
+            <a:ext cx="4717774" cy="365125"/>
           </a:xfrm>
           <a:prstGeom prst="rect">
             <a:avLst/>
@@ -2594,9 +2939,7 @@
             <a:lvl1pPr algn="ctr">
               <a:defRPr sz="1200">
                 <a:solidFill>
-                  <a:schemeClr val="tx1">
-                    <a:tint val="75000"/>
-                  </a:schemeClr>
+                  <a:schemeClr val="tx1"/>
                 </a:solidFill>
               </a:defRPr>
             </a:lvl1pPr>
@@ -2618,8 +2961,8 @@
         </p:nvSpPr>
         <p:spPr>
           <a:xfrm>
-            <a:off x="8610600" y="6356350"/>
-            <a:ext cx="2743200" cy="365125"/>
+            <a:off x="9329530" y="6223828"/>
+            <a:ext cx="1706217" cy="365125"/>
           </a:xfrm>
           <a:prstGeom prst="rect">
             <a:avLst/>
@@ -2631,9 +2974,7 @@
             <a:lvl1pPr algn="r">
               <a:defRPr sz="1200">
                 <a:solidFill>
-                  <a:schemeClr val="tx1">
-                    <a:tint val="75000"/>
-                  </a:schemeClr>
+                  <a:schemeClr val="tx1"/>
                 </a:solidFill>
               </a:defRPr>
             </a:lvl1pPr>
@@ -2650,23 +2991,23 @@
     </p:spTree>
     <p:extLst>
       <p:ext uri="{BB962C8B-B14F-4D97-AF65-F5344CB8AC3E}">
-        <p14:creationId xmlns:p14="http://schemas.microsoft.com/office/powerpoint/2010/main" val="4108713846"/>
+        <p14:creationId xmlns:p14="http://schemas.microsoft.com/office/powerpoint/2010/main" val="2506277039"/>
       </p:ext>
     </p:extLst>
   </p:cSld>
   <p:clrMap bg1="lt1" tx1="dk1" bg2="lt2" tx2="dk2" accent1="accent1" accent2="accent2" accent3="accent3" accent4="accent4" accent5="accent5" accent6="accent6" hlink="hlink" folHlink="folHlink"/>
   <p:sldLayoutIdLst>
-    <p:sldLayoutId id="2147483649" r:id="rId1"/>
-    <p:sldLayoutId id="2147483650" r:id="rId2"/>
-    <p:sldLayoutId id="2147483651" r:id="rId3"/>
-    <p:sldLayoutId id="2147483652" r:id="rId4"/>
-    <p:sldLayoutId id="2147483653" r:id="rId5"/>
-    <p:sldLayoutId id="2147483654" r:id="rId6"/>
-    <p:sldLayoutId id="2147483655" r:id="rId7"/>
-    <p:sldLayoutId id="2147483656" r:id="rId8"/>
-    <p:sldLayoutId id="2147483657" r:id="rId9"/>
-    <p:sldLayoutId id="2147483658" r:id="rId10"/>
-    <p:sldLayoutId id="2147483659" r:id="rId11"/>
+    <p:sldLayoutId id="2147483685" r:id="rId1"/>
+    <p:sldLayoutId id="2147483686" r:id="rId2"/>
+    <p:sldLayoutId id="2147483687" r:id="rId3"/>
+    <p:sldLayoutId id="2147483688" r:id="rId4"/>
+    <p:sldLayoutId id="2147483689" r:id="rId5"/>
+    <p:sldLayoutId id="2147483690" r:id="rId6"/>
+    <p:sldLayoutId id="2147483691" r:id="rId7"/>
+    <p:sldLayoutId id="2147483692" r:id="rId8"/>
+    <p:sldLayoutId id="2147483693" r:id="rId9"/>
+    <p:sldLayoutId id="2147483694" r:id="rId10"/>
+    <p:sldLayoutId id="2147483695" r:id="rId11"/>
   </p:sldLayoutIdLst>
   <p:txStyles>
     <p:titleStyle>
@@ -2689,16 +3030,20 @@
       </a:lvl1pPr>
     </p:titleStyle>
     <p:bodyStyle>
-      <a:lvl1pPr marL="228600" indent="-228600" algn="l" defTabSz="914400" rtl="0" eaLnBrk="1" latinLnBrk="0" hangingPunct="1">
+      <a:lvl1pPr marL="228600" indent="-182880" algn="l" defTabSz="914400" rtl="0" eaLnBrk="1" latinLnBrk="0" hangingPunct="1">
         <a:lnSpc>
           <a:spcPct val="90000"/>
         </a:lnSpc>
         <a:spcBef>
-          <a:spcPts val="1000"/>
+          <a:spcPts val="1400"/>
         </a:spcBef>
-        <a:buFont typeface="Arial" panose="020B0604020202020204" pitchFamily="34" charset="0"/>
+        <a:buClr>
+          <a:schemeClr val="tx1"/>
+        </a:buClr>
+        <a:buSzPct val="80000"/>
+        <a:buFont typeface="Corbel" pitchFamily="34" charset="0"/>
         <a:buChar char="•"/>
-        <a:defRPr sz="2800" kern="1200">
+        <a:defRPr sz="2200" kern="1200">
           <a:solidFill>
             <a:schemeClr val="tx1"/>
           </a:solidFill>
@@ -2707,32 +3052,21 @@
           <a:cs typeface="+mn-cs"/>
         </a:defRPr>
       </a:lvl1pPr>
-      <a:lvl2pPr marL="685800" indent="-228600" algn="l" defTabSz="914400" rtl="0" eaLnBrk="1" latinLnBrk="0" hangingPunct="1">
+      <a:lvl2pPr marL="457200" indent="-182880" algn="l" defTabSz="914400" rtl="0" eaLnBrk="1" latinLnBrk="0" hangingPunct="1">
         <a:lnSpc>
           <a:spcPct val="90000"/>
         </a:lnSpc>
         <a:spcBef>
-          <a:spcPts val="500"/>
+          <a:spcPts val="200"/>
         </a:spcBef>
-        <a:buFont typeface="Arial" panose="020B0604020202020204" pitchFamily="34" charset="0"/>
-        <a:buChar char="•"/>
-        <a:defRPr sz="2400" kern="1200">
-          <a:solidFill>
-            <a:schemeClr val="tx1"/>
-          </a:solidFill>
-          <a:latin typeface="+mn-lt"/>
-          <a:ea typeface="+mn-ea"/>
-          <a:cs typeface="+mn-cs"/>
-        </a:defRPr>
-      </a:lvl2pPr>
-      <a:lvl3pPr marL="1143000" indent="-228600" algn="l" defTabSz="914400" rtl="0" eaLnBrk="1" latinLnBrk="0" hangingPunct="1">
-        <a:lnSpc>
-          <a:spcPct val="90000"/>
-        </a:lnSpc>
-        <a:spcBef>
-          <a:spcPts val="500"/>
-        </a:spcBef>
-        <a:buFont typeface="Arial" panose="020B0604020202020204" pitchFamily="34" charset="0"/>
+        <a:spcAft>
+          <a:spcPts val="400"/>
+        </a:spcAft>
+        <a:buClr>
+          <a:schemeClr val="tx1"/>
+        </a:buClr>
+        <a:buSzPct val="80000"/>
+        <a:buFont typeface="Corbel" pitchFamily="34" charset="0"/>
         <a:buChar char="•"/>
         <a:defRPr sz="2000" kern="1200">
           <a:solidFill>
@@ -2742,15 +3076,22 @@
           <a:ea typeface="+mn-ea"/>
           <a:cs typeface="+mn-cs"/>
         </a:defRPr>
-      </a:lvl3pPr>
-      <a:lvl4pPr marL="1600200" indent="-228600" algn="l" defTabSz="914400" rtl="0" eaLnBrk="1" latinLnBrk="0" hangingPunct="1">
+      </a:lvl2pPr>
+      <a:lvl3pPr marL="731520" indent="-182880" algn="l" defTabSz="914400" rtl="0" eaLnBrk="1" latinLnBrk="0" hangingPunct="1">
         <a:lnSpc>
           <a:spcPct val="90000"/>
         </a:lnSpc>
         <a:spcBef>
-          <a:spcPts val="500"/>
+          <a:spcPts val="200"/>
         </a:spcBef>
-        <a:buFont typeface="Arial" panose="020B0604020202020204" pitchFamily="34" charset="0"/>
+        <a:spcAft>
+          <a:spcPts val="400"/>
+        </a:spcAft>
+        <a:buClr>
+          <a:schemeClr val="tx1"/>
+        </a:buClr>
+        <a:buSzPct val="80000"/>
+        <a:buFont typeface="Corbel" pitchFamily="34" charset="0"/>
         <a:buChar char="•"/>
         <a:defRPr sz="1800" kern="1200">
           <a:solidFill>
@@ -2760,17 +3101,49 @@
           <a:ea typeface="+mn-ea"/>
           <a:cs typeface="+mn-cs"/>
         </a:defRPr>
-      </a:lvl4pPr>
-      <a:lvl5pPr marL="2057400" indent="-228600" algn="l" defTabSz="914400" rtl="0" eaLnBrk="1" latinLnBrk="0" hangingPunct="1">
+      </a:lvl3pPr>
+      <a:lvl4pPr marL="1005840" indent="-182880" algn="l" defTabSz="914400" rtl="0" eaLnBrk="1" latinLnBrk="0" hangingPunct="1">
         <a:lnSpc>
           <a:spcPct val="90000"/>
         </a:lnSpc>
         <a:spcBef>
-          <a:spcPts val="500"/>
+          <a:spcPts val="200"/>
         </a:spcBef>
-        <a:buFont typeface="Arial" panose="020B0604020202020204" pitchFamily="34" charset="0"/>
+        <a:spcAft>
+          <a:spcPts val="400"/>
+        </a:spcAft>
+        <a:buClr>
+          <a:schemeClr val="tx1"/>
+        </a:buClr>
+        <a:buSzPct val="80000"/>
+        <a:buFont typeface="Corbel" pitchFamily="34" charset="0"/>
         <a:buChar char="•"/>
-        <a:defRPr sz="1800" kern="1200">
+        <a:defRPr sz="1600" kern="1200">
+          <a:solidFill>
+            <a:schemeClr val="tx1"/>
+          </a:solidFill>
+          <a:latin typeface="+mn-lt"/>
+          <a:ea typeface="+mn-ea"/>
+          <a:cs typeface="+mn-cs"/>
+        </a:defRPr>
+      </a:lvl4pPr>
+      <a:lvl5pPr marL="1280160" indent="-182880" algn="l" defTabSz="914400" rtl="0" eaLnBrk="1" latinLnBrk="0" hangingPunct="1">
+        <a:lnSpc>
+          <a:spcPct val="90000"/>
+        </a:lnSpc>
+        <a:spcBef>
+          <a:spcPts val="200"/>
+        </a:spcBef>
+        <a:spcAft>
+          <a:spcPts val="400"/>
+        </a:spcAft>
+        <a:buClr>
+          <a:schemeClr val="tx1"/>
+        </a:buClr>
+        <a:buSzPct val="80000"/>
+        <a:buFont typeface="Corbel" pitchFamily="34" charset="0"/>
+        <a:buChar char="•"/>
+        <a:defRPr sz="1600" kern="1200">
           <a:solidFill>
             <a:schemeClr val="tx1"/>
           </a:solidFill>
@@ -2779,16 +3152,23 @@
           <a:cs typeface="+mn-cs"/>
         </a:defRPr>
       </a:lvl5pPr>
-      <a:lvl6pPr marL="2514600" indent="-228600" algn="l" defTabSz="914400" rtl="0" eaLnBrk="1" latinLnBrk="0" hangingPunct="1">
+      <a:lvl6pPr marL="1600000" indent="-228600" algn="l" defTabSz="914400" rtl="0" eaLnBrk="1" latinLnBrk="0" hangingPunct="1">
         <a:lnSpc>
           <a:spcPct val="90000"/>
         </a:lnSpc>
         <a:spcBef>
-          <a:spcPts val="500"/>
+          <a:spcPts val="200"/>
         </a:spcBef>
-        <a:buFont typeface="Arial" panose="020B0604020202020204" pitchFamily="34" charset="0"/>
+        <a:spcAft>
+          <a:spcPts val="400"/>
+        </a:spcAft>
+        <a:buClr>
+          <a:schemeClr val="tx1"/>
+        </a:buClr>
+        <a:buSzPct val="80000"/>
+        <a:buFont typeface="Corbel" pitchFamily="34" charset="0"/>
         <a:buChar char="•"/>
-        <a:defRPr sz="1800" kern="1200">
+        <a:defRPr sz="1600" kern="1200">
           <a:solidFill>
             <a:schemeClr val="tx1"/>
           </a:solidFill>
@@ -2797,16 +3177,23 @@
           <a:cs typeface="+mn-cs"/>
         </a:defRPr>
       </a:lvl6pPr>
-      <a:lvl7pPr marL="2971800" indent="-228600" algn="l" defTabSz="914400" rtl="0" eaLnBrk="1" latinLnBrk="0" hangingPunct="1">
+      <a:lvl7pPr marL="1900000" indent="-228600" algn="l" defTabSz="914400" rtl="0" eaLnBrk="1" latinLnBrk="0" hangingPunct="1">
         <a:lnSpc>
           <a:spcPct val="90000"/>
         </a:lnSpc>
         <a:spcBef>
-          <a:spcPts val="500"/>
+          <a:spcPts val="200"/>
         </a:spcBef>
-        <a:buFont typeface="Arial" panose="020B0604020202020204" pitchFamily="34" charset="0"/>
+        <a:spcAft>
+          <a:spcPts val="400"/>
+        </a:spcAft>
+        <a:buClr>
+          <a:schemeClr val="tx1"/>
+        </a:buClr>
+        <a:buSzPct val="80000"/>
+        <a:buFont typeface="Corbel" pitchFamily="34" charset="0"/>
         <a:buChar char="•"/>
-        <a:defRPr sz="1800" kern="1200">
+        <a:defRPr sz="1600" kern="1200">
           <a:solidFill>
             <a:schemeClr val="tx1"/>
           </a:solidFill>
@@ -2815,16 +3202,23 @@
           <a:cs typeface="+mn-cs"/>
         </a:defRPr>
       </a:lvl7pPr>
-      <a:lvl8pPr marL="3429000" indent="-228600" algn="l" defTabSz="914400" rtl="0" eaLnBrk="1" latinLnBrk="0" hangingPunct="1">
+      <a:lvl8pPr marL="2200000" indent="-228600" algn="l" defTabSz="914400" rtl="0" eaLnBrk="1" latinLnBrk="0" hangingPunct="1">
         <a:lnSpc>
           <a:spcPct val="90000"/>
         </a:lnSpc>
         <a:spcBef>
-          <a:spcPts val="500"/>
+          <a:spcPts val="200"/>
         </a:spcBef>
-        <a:buFont typeface="Arial" panose="020B0604020202020204" pitchFamily="34" charset="0"/>
+        <a:spcAft>
+          <a:spcPts val="400"/>
+        </a:spcAft>
+        <a:buClr>
+          <a:schemeClr val="tx1"/>
+        </a:buClr>
+        <a:buSzPct val="80000"/>
+        <a:buFont typeface="Corbel" pitchFamily="34" charset="0"/>
         <a:buChar char="•"/>
-        <a:defRPr sz="1800" kern="1200">
+        <a:defRPr sz="1600" kern="1200">
           <a:solidFill>
             <a:schemeClr val="tx1"/>
           </a:solidFill>
@@ -2833,16 +3227,23 @@
           <a:cs typeface="+mn-cs"/>
         </a:defRPr>
       </a:lvl8pPr>
-      <a:lvl9pPr marL="3886200" indent="-228600" algn="l" defTabSz="914400" rtl="0" eaLnBrk="1" latinLnBrk="0" hangingPunct="1">
+      <a:lvl9pPr marL="2500000" indent="-228600" algn="l" defTabSz="914400" rtl="0" eaLnBrk="1" latinLnBrk="0" hangingPunct="1">
         <a:lnSpc>
           <a:spcPct val="90000"/>
         </a:lnSpc>
         <a:spcBef>
-          <a:spcPts val="500"/>
+          <a:spcPts val="200"/>
         </a:spcBef>
-        <a:buFont typeface="Arial" panose="020B0604020202020204" pitchFamily="34" charset="0"/>
+        <a:spcAft>
+          <a:spcPts val="400"/>
+        </a:spcAft>
+        <a:buClr>
+          <a:schemeClr val="tx1"/>
+        </a:buClr>
+        <a:buSzPct val="80000"/>
+        <a:buFont typeface="Corbel" pitchFamily="34" charset="0"/>
         <a:buChar char="•"/>
-        <a:defRPr sz="1800" kern="1200">
+        <a:defRPr sz="1600" kern="1200">
           <a:solidFill>
             <a:schemeClr val="tx1"/>
           </a:solidFill>
@@ -3039,6 +3440,13 @@
   <p:clrMapOvr>
     <a:masterClrMapping/>
   </p:clrMapOvr>
+  <p:timing>
+    <p:tnLst>
+      <p:par>
+        <p:cTn id="1" dur="indefinite" restart="never" nodeType="tmRoot"/>
+      </p:par>
+    </p:tnLst>
+  </p:timing>
 </p:sld>
 </file>
 
@@ -3069,7 +3477,12 @@
             <p:ph type="title"/>
           </p:nvPr>
         </p:nvSpPr>
-        <p:spPr/>
+        <p:spPr>
+          <a:xfrm>
+            <a:off x="477982" y="360218"/>
+            <a:ext cx="9875520" cy="1356360"/>
+          </a:xfrm>
+        </p:spPr>
         <p:txBody>
           <a:bodyPr/>
           <a:lstStyle/>
@@ -3094,81 +3507,95 @@
         </p:nvSpPr>
         <p:spPr>
           <a:xfrm>
-            <a:off x="838200" y="1395663"/>
-            <a:ext cx="10776284" cy="4781300"/>
+            <a:off x="838200" y="1571154"/>
+            <a:ext cx="10771909" cy="4922010"/>
           </a:xfrm>
         </p:spPr>
         <p:txBody>
-          <a:bodyPr/>
-          <a:lstStyle/>
-          <a:p>
-            <a:r>
-              <a:rPr lang="en-US" dirty="0" smtClean="0"/>
-              <a:t>Primary predictor: hard drug use at baseline (Yes vs. No)</a:t>
-            </a:r>
-          </a:p>
-          <a:p>
-            <a:r>
-              <a:rPr lang="en-US" dirty="0" smtClean="0"/>
-              <a:t>Covariates</a:t>
+          <a:bodyPr>
+            <a:normAutofit/>
+          </a:bodyPr>
+          <a:lstStyle/>
+          <a:p>
+            <a:r>
+              <a:rPr lang="en-US" sz="3200" dirty="0" smtClean="0"/>
+              <a:t>Research question:</a:t>
             </a:r>
           </a:p>
           <a:p>
             <a:pPr lvl="1"/>
             <a:r>
-              <a:rPr lang="en-US" dirty="0" smtClean="0"/>
-              <a:t>Baseline: age, BMI, alcohol use (13 or fewer vs. &gt;13 drinks), smoking status (never/former vs. current), income level (&lt;$10,000, $10,000-$40,000, &gt;$40,000), education (HS degree or less, &gt;HS degree)</a:t>
+              <a:rPr lang="en-US" sz="2800" dirty="0" smtClean="0"/>
+              <a:t>How do treatment responses after 2 years differ between subjects who report using hard drugs and those who didn’t?</a:t>
+            </a:r>
+          </a:p>
+          <a:p>
+            <a:r>
+              <a:rPr lang="en-US" sz="3200" dirty="0" smtClean="0"/>
+              <a:t>Primary predictor</a:t>
             </a:r>
           </a:p>
           <a:p>
             <a:pPr lvl="1"/>
             <a:r>
-              <a:rPr lang="en-US" dirty="0" smtClean="0"/>
-              <a:t>2 year: ART adherence (&gt;95% vs. &lt;95%)</a:t>
-            </a:r>
-            <a:endParaRPr lang="en-US" dirty="0" smtClean="0"/>
-          </a:p>
-          <a:p>
-            <a:r>
-              <a:rPr lang="en-US" dirty="0" smtClean="0"/>
-              <a:t>Significant differences between hard drug use groups (Yes vs. No)</a:t>
-            </a:r>
+              <a:rPr lang="en-US" sz="2800" dirty="0" smtClean="0"/>
+              <a:t>H</a:t>
+            </a:r>
+            <a:r>
+              <a:rPr lang="en-US" sz="2800" dirty="0" smtClean="0"/>
+              <a:t>ard </a:t>
+            </a:r>
+            <a:r>
+              <a:rPr lang="en-US" sz="2800" dirty="0" smtClean="0"/>
+              <a:t>drug use at baseline (</a:t>
+            </a:r>
+            <a:r>
+              <a:rPr lang="en-US" sz="2800" dirty="0" smtClean="0"/>
+              <a:t>Yes (n =  467) vs</a:t>
+            </a:r>
+            <a:r>
+              <a:rPr lang="en-US" sz="2800" dirty="0" smtClean="0"/>
+              <a:t>. </a:t>
+            </a:r>
+            <a:r>
+              <a:rPr lang="en-US" sz="2800" dirty="0" smtClean="0"/>
+              <a:t>No (n = 39))</a:t>
+            </a:r>
+            <a:endParaRPr lang="en-US" sz="2800" dirty="0" smtClean="0"/>
+          </a:p>
+          <a:p>
+            <a:r>
+              <a:rPr lang="en-US" sz="3200" dirty="0" smtClean="0"/>
+              <a:t>Covariates selected by investigator</a:t>
+            </a:r>
+            <a:endParaRPr lang="en-US" sz="3200" dirty="0" smtClean="0"/>
           </a:p>
           <a:p>
             <a:pPr lvl="1"/>
             <a:r>
-              <a:rPr lang="en-US" dirty="0" smtClean="0"/>
-              <a:t>BMI (p = 0.006; mean is higher in No group)</a:t>
+              <a:rPr lang="en-US" sz="2800" u="sng" dirty="0" smtClean="0"/>
+              <a:t>Baseline:</a:t>
+            </a:r>
+            <a:r>
+              <a:rPr lang="en-US" sz="2800" dirty="0" smtClean="0"/>
+              <a:t> age, BMI, alcohol use (13 or fewer vs. &gt;13 drinks), smoking status (never/former vs. current), income level (&lt;$10,000, $10,000-$40,000, &gt;$40,000), education (HS degree or less, &gt;HS degree)</a:t>
             </a:r>
           </a:p>
           <a:p>
             <a:pPr lvl="1"/>
             <a:r>
-              <a:rPr lang="en-US" dirty="0" smtClean="0"/>
-              <a:t>Smoking status (p &lt; 0.0001; higher proportion of current smokers in Yes group)</a:t>
-            </a:r>
-          </a:p>
-          <a:p>
-            <a:pPr lvl="1"/>
-            <a:r>
-              <a:rPr lang="en-US" dirty="0" smtClean="0"/>
-              <a:t>Education at baseline (p =0.0005; higher proportion of &gt;HS in No group)</a:t>
-            </a:r>
-          </a:p>
-          <a:p>
-            <a:pPr lvl="1"/>
-            <a:r>
-              <a:rPr lang="en-US" dirty="0" smtClean="0"/>
-              <a:t>Baseline SF36 score (p =0.015; mean score is higher in </a:t>
-            </a:r>
-            <a:r>
-              <a:rPr lang="en-US" smtClean="0"/>
-              <a:t>No group)</a:t>
-            </a:r>
-            <a:endParaRPr lang="en-US" dirty="0" smtClean="0"/>
-          </a:p>
-          <a:p>
-            <a:pPr lvl="1"/>
+              <a:rPr lang="en-US" sz="2800" u="sng" dirty="0" smtClean="0"/>
+              <a:t>2 year:</a:t>
+            </a:r>
+            <a:r>
+              <a:rPr lang="en-US" sz="2800" dirty="0" smtClean="0"/>
+              <a:t> ART adherence (&gt;95% vs. &lt;95%)</a:t>
+            </a:r>
+          </a:p>
+          <a:p>
+            <a:pPr marL="457200" lvl="1" indent="0">
+              <a:buNone/>
+            </a:pPr>
             <a:endParaRPr lang="en-US" dirty="0"/>
           </a:p>
           <a:p>
@@ -3195,6 +3622,13 @@
   <p:clrMapOvr>
     <a:masterClrMapping/>
   </p:clrMapOvr>
+  <p:timing>
+    <p:tnLst>
+      <p:par>
+        <p:cTn id="1" dur="indefinite" restart="never" nodeType="tmRoot"/>
+      </p:par>
+    </p:tnLst>
+  </p:timing>
 </p:sld>
 </file>
 
@@ -3215,58 +3649,47 @@
           <a:chExt cx="0" cy="0"/>
         </a:xfrm>
       </p:grpSpPr>
-      <p:sp>
-        <p:nvSpPr>
-          <p:cNvPr id="2" name="Title 1"/>
-          <p:cNvSpPr>
-            <a:spLocks noGrp="1"/>
-          </p:cNvSpPr>
-          <p:nvPr>
-            <p:ph type="title"/>
-          </p:nvPr>
-        </p:nvSpPr>
-        <p:spPr/>
-        <p:txBody>
-          <a:bodyPr/>
-          <a:lstStyle/>
-          <a:p>
-            <a:r>
-              <a:rPr lang="en-US" dirty="0" smtClean="0"/>
-              <a:t>Data Summary</a:t>
-            </a:r>
-            <a:endParaRPr lang="en-US" dirty="0"/>
-          </a:p>
-        </p:txBody>
-      </p:sp>
-      <p:sp>
-        <p:nvSpPr>
-          <p:cNvPr id="7" name="Content Placeholder 6"/>
-          <p:cNvSpPr>
-            <a:spLocks noGrp="1"/>
-          </p:cNvSpPr>
-          <p:nvPr>
-            <p:ph idx="1"/>
-          </p:nvPr>
-        </p:nvSpPr>
-        <p:spPr/>
-        <p:txBody>
-          <a:bodyPr/>
-          <a:lstStyle/>
-          <a:p>
-            <a:endParaRPr lang="en-US" dirty="0"/>
-          </a:p>
-        </p:txBody>
-      </p:sp>
+      <p:pic>
+        <p:nvPicPr>
+          <p:cNvPr id="4" name="Picture 3"/>
+          <p:cNvPicPr>
+            <a:picLocks noChangeAspect="1"/>
+          </p:cNvPicPr>
+          <p:nvPr/>
+        </p:nvPicPr>
+        <p:blipFill>
+          <a:blip r:embed="rId2"/>
+          <a:stretch>
+            <a:fillRect/>
+          </a:stretch>
+        </p:blipFill>
+        <p:spPr>
+          <a:xfrm>
+            <a:off x="1948871" y="148144"/>
+            <a:ext cx="8026401" cy="7010040"/>
+          </a:xfrm>
+          <a:prstGeom prst="rect">
+            <a:avLst/>
+          </a:prstGeom>
+        </p:spPr>
+      </p:pic>
     </p:spTree>
     <p:extLst>
       <p:ext uri="{BB962C8B-B14F-4D97-AF65-F5344CB8AC3E}">
-        <p14:creationId xmlns:p14="http://schemas.microsoft.com/office/powerpoint/2010/main" val="3677222273"/>
+        <p14:creationId xmlns:p14="http://schemas.microsoft.com/office/powerpoint/2010/main" val="1823672023"/>
       </p:ext>
     </p:extLst>
   </p:cSld>
   <p:clrMapOvr>
     <a:masterClrMapping/>
   </p:clrMapOvr>
+  <p:timing>
+    <p:tnLst>
+      <p:par>
+        <p:cTn id="1" dur="indefinite" restart="never" nodeType="tmRoot"/>
+      </p:par>
+    </p:tnLst>
+  </p:timing>
 </p:sld>
 </file>
 
@@ -3297,14 +3720,23 @@
             <p:ph type="title"/>
           </p:nvPr>
         </p:nvSpPr>
-        <p:spPr/>
+        <p:spPr>
+          <a:xfrm>
+            <a:off x="459509" y="480291"/>
+            <a:ext cx="9875520" cy="1356360"/>
+          </a:xfrm>
+        </p:spPr>
         <p:txBody>
           <a:bodyPr/>
           <a:lstStyle/>
           <a:p>
             <a:r>
               <a:rPr lang="en-US" dirty="0" smtClean="0"/>
-              <a:t>Data Analysis Plan &amp; Questions</a:t>
+              <a:t>Data Analysis </a:t>
+            </a:r>
+            <a:r>
+              <a:rPr lang="en-US" dirty="0" smtClean="0"/>
+              <a:t>Plan &amp; Questions</a:t>
             </a:r>
             <a:endParaRPr lang="en-US" dirty="0"/>
           </a:p>
@@ -3320,41 +3752,105 @@
             <p:ph idx="1"/>
           </p:nvPr>
         </p:nvSpPr>
-        <p:spPr/>
-        <p:txBody>
-          <a:bodyPr/>
-          <a:lstStyle/>
-          <a:p>
-            <a:r>
-              <a:rPr lang="en-US" dirty="0" smtClean="0"/>
-              <a:t>Primary outcome:</a:t>
-            </a:r>
-          </a:p>
-          <a:p>
-            <a:r>
-              <a:rPr lang="en-US" dirty="0" smtClean="0"/>
-              <a:t>Other outcomes:</a:t>
-            </a:r>
-          </a:p>
-          <a:p>
-            <a:r>
-              <a:rPr lang="en-US" dirty="0" smtClean="0"/>
-              <a:t>Model plan:	</a:t>
-            </a:r>
+        <p:spPr>
+          <a:xfrm>
+            <a:off x="838200" y="1548534"/>
+            <a:ext cx="10515600" cy="4944630"/>
+          </a:xfrm>
+        </p:spPr>
+        <p:txBody>
+          <a:bodyPr>
+            <a:normAutofit/>
+          </a:bodyPr>
+          <a:lstStyle/>
+          <a:p>
+            <a:r>
+              <a:rPr lang="en-US" sz="3200" dirty="0" smtClean="0"/>
+              <a:t>Outcomes</a:t>
+            </a:r>
+            <a:endParaRPr lang="en-US" sz="3200" dirty="0" smtClean="0"/>
           </a:p>
           <a:p>
             <a:pPr lvl="1"/>
             <a:r>
-              <a:rPr lang="en-US" dirty="0" smtClean="0"/>
-              <a:t>Hybrid model (difference as outcome, adjust for baseline value)</a:t>
+              <a:rPr lang="en-US" sz="2800" dirty="0" smtClean="0"/>
+              <a:t>Viral load, CD4+ count, SF36 MCS score, SC36 PCS score</a:t>
+            </a:r>
+            <a:endParaRPr lang="en-US" sz="2800" dirty="0" smtClean="0"/>
+          </a:p>
+          <a:p>
+            <a:r>
+              <a:rPr lang="en-US" sz="3200" dirty="0" smtClean="0"/>
+              <a:t>Model </a:t>
+            </a:r>
+            <a:r>
+              <a:rPr lang="en-US" sz="3200" dirty="0" smtClean="0"/>
+              <a:t>plan</a:t>
             </a:r>
           </a:p>
           <a:p>
             <a:pPr lvl="1"/>
             <a:r>
-              <a:rPr lang="en-US" dirty="0" smtClean="0"/>
-              <a:t>Bayesian approach </a:t>
-            </a:r>
+              <a:rPr lang="en-US" sz="2800" dirty="0"/>
+              <a:t>Hybrid </a:t>
+            </a:r>
+            <a:r>
+              <a:rPr lang="en-US" sz="2800" dirty="0" smtClean="0"/>
+              <a:t>model </a:t>
+            </a:r>
+            <a:r>
+              <a:rPr lang="en-US" sz="2800" dirty="0"/>
+              <a:t>(difference as outcome, adjust for baseline)</a:t>
+            </a:r>
+          </a:p>
+          <a:p>
+            <a:pPr lvl="1"/>
+            <a:r>
+              <a:rPr lang="en-US" sz="2800" dirty="0"/>
+              <a:t>Bayesian approach to </a:t>
+            </a:r>
+            <a:r>
+              <a:rPr lang="en-US" sz="2800" dirty="0" smtClean="0"/>
+              <a:t>analysis</a:t>
+            </a:r>
+            <a:endParaRPr lang="en-US" sz="2800" dirty="0"/>
+          </a:p>
+          <a:p>
+            <a:r>
+              <a:rPr lang="en-US" sz="3200" dirty="0" smtClean="0"/>
+              <a:t>Questions</a:t>
+            </a:r>
+          </a:p>
+          <a:p>
+            <a:pPr lvl="1"/>
+            <a:r>
+              <a:rPr lang="en-US" sz="2800" dirty="0" smtClean="0"/>
+              <a:t>Outliers in viral load--what are feasible values for this variable?</a:t>
+            </a:r>
+          </a:p>
+          <a:p>
+            <a:pPr lvl="1"/>
+            <a:r>
+              <a:rPr lang="en-US" sz="2800" dirty="0" smtClean="0"/>
+              <a:t>If you could only analyze one outcome, what would you pick?</a:t>
+            </a:r>
+          </a:p>
+          <a:p>
+            <a:pPr lvl="1"/>
+            <a:r>
+              <a:rPr lang="en-US" sz="2800" dirty="0" smtClean="0"/>
+              <a:t>Do you only want to include subjects with outcome data for all 4 outcomes?</a:t>
+            </a:r>
+          </a:p>
+          <a:p>
+            <a:pPr lvl="1"/>
+            <a:endParaRPr lang="en-US" dirty="0"/>
+          </a:p>
+          <a:p>
+            <a:pPr marL="0" indent="0">
+              <a:buNone/>
+            </a:pPr>
+            <a:endParaRPr lang="en-US" dirty="0" smtClean="0"/>
           </a:p>
         </p:txBody>
       </p:sp>
@@ -3368,195 +3864,69 @@
   <p:clrMapOvr>
     <a:masterClrMapping/>
   </p:clrMapOvr>
-</p:sld>
-</file>
-
-<file path=ppt/slides/slide5.xml><?xml version="1.0" encoding="utf-8"?>
-<p:sld xmlns:a="http://schemas.openxmlformats.org/drawingml/2006/main" xmlns:r="http://schemas.openxmlformats.org/officeDocument/2006/relationships" xmlns:p="http://schemas.openxmlformats.org/presentationml/2006/main">
-  <p:cSld>
-    <p:spTree>
-      <p:nvGrpSpPr>
-        <p:cNvPr id="1" name=""/>
-        <p:cNvGrpSpPr/>
-        <p:nvPr/>
-      </p:nvGrpSpPr>
-      <p:grpSpPr>
-        <a:xfrm>
-          <a:off x="0" y="0"/>
-          <a:ext cx="0" cy="0"/>
-          <a:chOff x="0" y="0"/>
-          <a:chExt cx="0" cy="0"/>
-        </a:xfrm>
-      </p:grpSpPr>
-      <p:sp>
-        <p:nvSpPr>
-          <p:cNvPr id="2" name="Title 1"/>
-          <p:cNvSpPr>
-            <a:spLocks noGrp="1"/>
-          </p:cNvSpPr>
-          <p:nvPr>
-            <p:ph type="title"/>
-          </p:nvPr>
-        </p:nvSpPr>
-        <p:spPr/>
-        <p:txBody>
-          <a:bodyPr/>
-          <a:lstStyle/>
-          <a:p>
-            <a:r>
-              <a:rPr lang="en-US" dirty="0" smtClean="0"/>
-              <a:t>Issues &amp; Questions</a:t>
-            </a:r>
-            <a:endParaRPr lang="en-US" dirty="0"/>
-          </a:p>
-        </p:txBody>
-      </p:sp>
-      <p:sp>
-        <p:nvSpPr>
-          <p:cNvPr id="3" name="Content Placeholder 2"/>
-          <p:cNvSpPr>
-            <a:spLocks noGrp="1"/>
-          </p:cNvSpPr>
-          <p:nvPr>
-            <p:ph idx="1"/>
-          </p:nvPr>
-        </p:nvSpPr>
-        <p:spPr/>
-        <p:txBody>
-          <a:bodyPr/>
-          <a:lstStyle/>
-          <a:p>
-            <a:r>
-              <a:rPr lang="en-US" dirty="0" smtClean="0"/>
-              <a:t>Outliers in viral load</a:t>
-            </a:r>
-          </a:p>
-          <a:p>
-            <a:pPr lvl="1"/>
-            <a:r>
-              <a:rPr lang="en-US" dirty="0" smtClean="0"/>
-              <a:t>What is a feasible range for this value?</a:t>
-            </a:r>
-          </a:p>
-          <a:p>
-            <a:r>
-              <a:rPr lang="en-US" dirty="0" smtClean="0"/>
-              <a:t>z</a:t>
-            </a:r>
-          </a:p>
-          <a:p>
-            <a:pPr lvl="1"/>
-            <a:endParaRPr lang="en-US" dirty="0"/>
-          </a:p>
-          <a:p>
-            <a:pPr marL="457200" lvl="1" indent="0">
-              <a:buNone/>
-            </a:pPr>
-            <a:endParaRPr lang="en-US" dirty="0"/>
-          </a:p>
-        </p:txBody>
-      </p:sp>
-    </p:spTree>
-    <p:extLst>
-      <p:ext uri="{BB962C8B-B14F-4D97-AF65-F5344CB8AC3E}">
-        <p14:creationId xmlns:p14="http://schemas.microsoft.com/office/powerpoint/2010/main" val="3727801539"/>
-      </p:ext>
-    </p:extLst>
-  </p:cSld>
-  <p:clrMapOvr>
-    <a:masterClrMapping/>
-  </p:clrMapOvr>
+  <p:timing>
+    <p:tnLst>
+      <p:par>
+        <p:cTn id="1" dur="indefinite" restart="never" nodeType="tmRoot"/>
+      </p:par>
+    </p:tnLst>
+  </p:timing>
 </p:sld>
 </file>
 
 <file path=ppt/theme/theme1.xml><?xml version="1.0" encoding="utf-8"?>
-<a:theme xmlns:a="http://schemas.openxmlformats.org/drawingml/2006/main" name="Office Theme">
+<a:theme xmlns:a="http://schemas.openxmlformats.org/drawingml/2006/main" name="Basis">
   <a:themeElements>
-    <a:clrScheme name="Office">
+    <a:clrScheme name="Basis">
       <a:dk1>
-        <a:sysClr val="windowText" lastClr="000000"/>
+        <a:srgbClr val="000000"/>
       </a:dk1>
       <a:lt1>
-        <a:sysClr val="window" lastClr="FFFFFF"/>
+        <a:srgbClr val="FFFFFF"/>
       </a:lt1>
       <a:dk2>
-        <a:srgbClr val="44546A"/>
+        <a:srgbClr val="565349"/>
       </a:dk2>
       <a:lt2>
-        <a:srgbClr val="E7E6E6"/>
+        <a:srgbClr val="DDDDDD"/>
       </a:lt2>
       <a:accent1>
-        <a:srgbClr val="5B9BD5"/>
+        <a:srgbClr val="A6B727"/>
       </a:accent1>
       <a:accent2>
-        <a:srgbClr val="ED7D31"/>
+        <a:srgbClr val="DF5327"/>
       </a:accent2>
       <a:accent3>
-        <a:srgbClr val="A5A5A5"/>
+        <a:srgbClr val="FE9E00"/>
       </a:accent3>
       <a:accent4>
-        <a:srgbClr val="FFC000"/>
+        <a:srgbClr val="418AB3"/>
       </a:accent4>
       <a:accent5>
-        <a:srgbClr val="4472C4"/>
+        <a:srgbClr val="D7D447"/>
       </a:accent5>
       <a:accent6>
-        <a:srgbClr val="70AD47"/>
+        <a:srgbClr val="818183"/>
       </a:accent6>
       <a:hlink>
-        <a:srgbClr val="0563C1"/>
+        <a:srgbClr val="F59E00"/>
       </a:hlink>
       <a:folHlink>
-        <a:srgbClr val="954F72"/>
+        <a:srgbClr val="B2B2B2"/>
       </a:folHlink>
     </a:clrScheme>
-    <a:fontScheme name="Office">
+    <a:fontScheme name="Basis">
       <a:majorFont>
-        <a:latin typeface="Calibri Light" panose="020F0302020204030204"/>
+        <a:latin typeface="Corbel" panose="020B0503020204020204"/>
         <a:ea typeface=""/>
         <a:cs typeface=""/>
-        <a:font script="Jpan" typeface="游ゴシック Light"/>
+        <a:font script="Jpan" typeface="ＭＳ ゴシック"/>
         <a:font script="Hang" typeface="맑은 고딕"/>
-        <a:font script="Hans" typeface="等线 Light"/>
+        <a:font script="Hans" typeface="宋体"/>
         <a:font script="Hant" typeface="新細明體"/>
-        <a:font script="Arab" typeface="Times New Roman"/>
-        <a:font script="Hebr" typeface="Times New Roman"/>
-        <a:font script="Thai" typeface="Angsana New"/>
-        <a:font script="Ethi" typeface="Nyala"/>
-        <a:font script="Beng" typeface="Vrinda"/>
-        <a:font script="Gujr" typeface="Shruti"/>
-        <a:font script="Khmr" typeface="MoolBoran"/>
-        <a:font script="Knda" typeface="Tunga"/>
-        <a:font script="Guru" typeface="Raavi"/>
-        <a:font script="Cans" typeface="Euphemia"/>
-        <a:font script="Cher" typeface="Plantagenet Cherokee"/>
-        <a:font script="Yiii" typeface="Microsoft Yi Baiti"/>
-        <a:font script="Tibt" typeface="Microsoft Himalaya"/>
-        <a:font script="Thaa" typeface="MV Boli"/>
-        <a:font script="Deva" typeface="Mangal"/>
-        <a:font script="Telu" typeface="Gautami"/>
-        <a:font script="Taml" typeface="Latha"/>
-        <a:font script="Syrc" typeface="Estrangelo Edessa"/>
-        <a:font script="Orya" typeface="Kalinga"/>
-        <a:font script="Mlym" typeface="Kartika"/>
-        <a:font script="Laoo" typeface="DokChampa"/>
-        <a:font script="Sinh" typeface="Iskoola Pota"/>
-        <a:font script="Mong" typeface="Mongolian Baiti"/>
-        <a:font script="Viet" typeface="Times New Roman"/>
-        <a:font script="Uigh" typeface="Microsoft Uighur"/>
-        <a:font script="Geor" typeface="Sylfaen"/>
-      </a:majorFont>
-      <a:minorFont>
-        <a:latin typeface="Calibri" panose="020F0502020204030204"/>
-        <a:ea typeface=""/>
-        <a:cs typeface=""/>
-        <a:font script="Jpan" typeface="游ゴシック"/>
-        <a:font script="Hang" typeface="맑은 고딕"/>
-        <a:font script="Hans" typeface="等线"/>
-        <a:font script="Hant" typeface="新細明體"/>
-        <a:font script="Arab" typeface="Arial"/>
-        <a:font script="Hebr" typeface="Arial"/>
-        <a:font script="Thai" typeface="Cordia New"/>
+        <a:font script="Arab" typeface="Tahoma"/>
+        <a:font script="Hebr" typeface="Gisha"/>
+        <a:font script="Thai" typeface="DilleniaUPC"/>
         <a:font script="Ethi" typeface="Nyala"/>
         <a:font script="Beng" typeface="Vrinda"/>
         <a:font script="Gujr" typeface="Shruti"/>
@@ -3577,90 +3947,98 @@
         <a:font script="Laoo" typeface="DokChampa"/>
         <a:font script="Sinh" typeface="Iskoola Pota"/>
         <a:font script="Mong" typeface="Mongolian Baiti"/>
-        <a:font script="Viet" typeface="Arial"/>
+        <a:font script="Viet" typeface="Tahoma"/>
+        <a:font script="Uigh" typeface="Microsoft Uighur"/>
+        <a:font script="Geor" typeface="Sylfaen"/>
+      </a:majorFont>
+      <a:minorFont>
+        <a:latin typeface="Corbel" panose="020B0503020204020204"/>
+        <a:ea typeface=""/>
+        <a:cs typeface=""/>
+        <a:font script="Jpan" typeface="ＭＳ ゴシック"/>
+        <a:font script="Hang" typeface="맑은 고딕"/>
+        <a:font script="Hans" typeface="宋体"/>
+        <a:font script="Hant" typeface="新細明體"/>
+        <a:font script="Arab" typeface="Tahoma"/>
+        <a:font script="Hebr" typeface="Gisha"/>
+        <a:font script="Thai" typeface="DilleniaUPC"/>
+        <a:font script="Ethi" typeface="Nyala"/>
+        <a:font script="Beng" typeface="Vrinda"/>
+        <a:font script="Gujr" typeface="Shruti"/>
+        <a:font script="Khmr" typeface="DaunPenh"/>
+        <a:font script="Knda" typeface="Tunga"/>
+        <a:font script="Guru" typeface="Raavi"/>
+        <a:font script="Cans" typeface="Euphemia"/>
+        <a:font script="Cher" typeface="Plantagenet Cherokee"/>
+        <a:font script="Yiii" typeface="Microsoft Yi Baiti"/>
+        <a:font script="Tibt" typeface="Microsoft Himalaya"/>
+        <a:font script="Thaa" typeface="MV Boli"/>
+        <a:font script="Deva" typeface="Mangal"/>
+        <a:font script="Telu" typeface="Gautami"/>
+        <a:font script="Taml" typeface="Latha"/>
+        <a:font script="Syrc" typeface="Estrangelo Edessa"/>
+        <a:font script="Orya" typeface="Kalinga"/>
+        <a:font script="Mlym" typeface="Kartika"/>
+        <a:font script="Laoo" typeface="DokChampa"/>
+        <a:font script="Sinh" typeface="Iskoola Pota"/>
+        <a:font script="Mong" typeface="Mongolian Baiti"/>
+        <a:font script="Viet" typeface="Verdana"/>
         <a:font script="Uigh" typeface="Microsoft Uighur"/>
         <a:font script="Geor" typeface="Sylfaen"/>
       </a:minorFont>
     </a:fontScheme>
-    <a:fmtScheme name="Office">
+    <a:fmtScheme name="Basis">
       <a:fillStyleLst>
         <a:solidFill>
           <a:schemeClr val="phClr"/>
         </a:solidFill>
+        <a:solidFill>
+          <a:schemeClr val="phClr">
+            <a:tint val="55000"/>
+            <a:satMod val="130000"/>
+          </a:schemeClr>
+        </a:solidFill>
         <a:gradFill rotWithShape="1">
           <a:gsLst>
             <a:gs pos="0">
+              <a:schemeClr val="phClr"/>
+            </a:gs>
+            <a:gs pos="90000">
               <a:schemeClr val="phClr">
-                <a:lumMod val="110000"/>
+                <a:shade val="100000"/>
                 <a:satMod val="105000"/>
-                <a:tint val="67000"/>
-              </a:schemeClr>
-            </a:gs>
-            <a:gs pos="50000">
-              <a:schemeClr val="phClr">
-                <a:lumMod val="105000"/>
-                <a:satMod val="103000"/>
-                <a:tint val="73000"/>
               </a:schemeClr>
             </a:gs>
             <a:gs pos="100000">
               <a:schemeClr val="phClr">
-                <a:lumMod val="105000"/>
-                <a:satMod val="109000"/>
-                <a:tint val="81000"/>
+                <a:shade val="80000"/>
+                <a:satMod val="120000"/>
               </a:schemeClr>
             </a:gs>
           </a:gsLst>
-          <a:lin ang="5400000" scaled="0"/>
-        </a:gradFill>
-        <a:gradFill rotWithShape="1">
-          <a:gsLst>
-            <a:gs pos="0">
-              <a:schemeClr val="phClr">
-                <a:satMod val="103000"/>
-                <a:lumMod val="102000"/>
-                <a:tint val="94000"/>
-              </a:schemeClr>
-            </a:gs>
-            <a:gs pos="50000">
-              <a:schemeClr val="phClr">
-                <a:satMod val="110000"/>
-                <a:lumMod val="100000"/>
-                <a:shade val="100000"/>
-              </a:schemeClr>
-            </a:gs>
-            <a:gs pos="100000">
-              <a:schemeClr val="phClr">
-                <a:lumMod val="99000"/>
-                <a:satMod val="120000"/>
-                <a:shade val="78000"/>
-              </a:schemeClr>
-            </a:gs>
-          </a:gsLst>
-          <a:lin ang="5400000" scaled="0"/>
+          <a:path path="circle">
+            <a:fillToRect l="100000" t="100000" r="100000" b="100000"/>
+          </a:path>
         </a:gradFill>
       </a:fillStyleLst>
       <a:lnStyleLst>
-        <a:ln w="6350" cap="flat" cmpd="sng" algn="ctr">
+        <a:ln w="10000" cap="flat" cmpd="sng" algn="ctr">
           <a:solidFill>
             <a:schemeClr val="phClr"/>
           </a:solidFill>
           <a:prstDash val="solid"/>
-          <a:miter lim="800000"/>
-        </a:ln>
-        <a:ln w="12700" cap="flat" cmpd="sng" algn="ctr">
-          <a:solidFill>
-            <a:schemeClr val="phClr"/>
-          </a:solidFill>
-          <a:prstDash val="solid"/>
-          <a:miter lim="800000"/>
         </a:ln>
         <a:ln w="19050" cap="flat" cmpd="sng" algn="ctr">
           <a:solidFill>
             <a:schemeClr val="phClr"/>
           </a:solidFill>
           <a:prstDash val="solid"/>
-          <a:miter lim="800000"/>
+        </a:ln>
+        <a:ln w="53975" cap="flat" cmpd="dbl" algn="ctr">
+          <a:solidFill>
+            <a:schemeClr val="phClr"/>
+          </a:solidFill>
+          <a:prstDash val="solid"/>
         </a:ln>
       </a:lnStyleLst>
       <a:effectStyleLst>
@@ -3668,16 +4046,37 @@
           <a:effectLst/>
         </a:effectStyle>
         <a:effectStyle>
-          <a:effectLst/>
+          <a:effectLst>
+            <a:outerShdw blurRad="38100" dist="25400" dir="5400000" rotWithShape="0">
+              <a:srgbClr val="000000">
+                <a:alpha val="45000"/>
+              </a:srgbClr>
+            </a:outerShdw>
+          </a:effectLst>
         </a:effectStyle>
         <a:effectStyle>
           <a:effectLst>
-            <a:outerShdw blurRad="57150" dist="19050" dir="5400000" algn="ctr" rotWithShape="0">
+            <a:outerShdw blurRad="38100" dist="25400" dir="5400000" rotWithShape="0">
               <a:srgbClr val="000000">
-                <a:alpha val="63000"/>
+                <a:alpha val="45000"/>
               </a:srgbClr>
             </a:outerShdw>
           </a:effectLst>
+          <a:scene3d>
+            <a:camera prst="orthographicFront">
+              <a:rot lat="0" lon="0" rev="0"/>
+            </a:camera>
+            <a:lightRig rig="brightRoom" dir="t"/>
+          </a:scene3d>
+          <a:sp3d extrusionH="12700" contourW="25400" prstMaterial="flat">
+            <a:bevelT w="63500" h="152400" prst="angle"/>
+            <a:contourClr>
+              <a:schemeClr val="phClr">
+                <a:shade val="27000"/>
+                <a:satMod val="120000"/>
+              </a:schemeClr>
+            </a:contourClr>
+          </a:sp3d>
         </a:effectStyle>
       </a:effectStyleLst>
       <a:bgFillStyleLst>
@@ -3687,36 +4086,18 @@
         <a:solidFill>
           <a:schemeClr val="phClr">
             <a:tint val="95000"/>
-            <a:satMod val="170000"/>
+            <a:shade val="95000"/>
+            <a:satMod val="140000"/>
           </a:schemeClr>
         </a:solidFill>
-        <a:gradFill rotWithShape="1">
-          <a:gsLst>
-            <a:gs pos="0">
-              <a:schemeClr val="phClr">
-                <a:tint val="93000"/>
-                <a:satMod val="150000"/>
-                <a:shade val="98000"/>
-                <a:lumMod val="102000"/>
-              </a:schemeClr>
-            </a:gs>
-            <a:gs pos="50000">
-              <a:schemeClr val="phClr">
-                <a:tint val="98000"/>
-                <a:satMod val="130000"/>
-                <a:shade val="90000"/>
-                <a:lumMod val="103000"/>
-              </a:schemeClr>
-            </a:gs>
-            <a:gs pos="100000">
-              <a:schemeClr val="phClr">
-                <a:shade val="63000"/>
-                <a:satMod val="120000"/>
-              </a:schemeClr>
-            </a:gs>
-          </a:gsLst>
-          <a:lin ang="5400000" scaled="0"/>
-        </a:gradFill>
+        <a:solidFill>
+          <a:schemeClr val="phClr">
+            <a:tint val="90000"/>
+            <a:shade val="85000"/>
+            <a:satMod val="160000"/>
+            <a:lumMod val="110000"/>
+          </a:schemeClr>
+        </a:solidFill>
       </a:bgFillStyleLst>
     </a:fmtScheme>
   </a:themeElements>
@@ -3724,7 +4105,7 @@
   <a:extraClrSchemeLst/>
   <a:extLst>
     <a:ext uri="{05A4C25C-085E-4340-85A3-A5531E510DB2}">
-      <thm15:themeFamily xmlns:thm15="http://schemas.microsoft.com/office/thememl/2012/main" name="Office Theme" id="{62F939B6-93AF-4DB8-9C6B-D6C7DFDC589F}" vid="{4A3C46E8-61CC-4603-A589-7422A47A8E4A}"/>
+      <thm15:themeFamily xmlns:thm15="http://schemas.microsoft.com/office/thememl/2012/main" name="Basis" id="{5665723A-49BA-4B57-8411-A56F8F207965}" vid="{ACC63D00-1EE0-4159-BF5A-6FF02000B710}"/>
     </a:ext>
   </a:extLst>
 </a:theme>

</xml_diff>

<commit_message>
Fixed typo in power point
</commit_message>
<xml_diff>
--- a/Project1/Reports/Project 1 Interim Presentation.pptx
+++ b/Project1/Reports/Project 1 Interim Presentation.pptx
@@ -3539,36 +3539,14 @@
             <a:pPr lvl="1"/>
             <a:r>
               <a:rPr lang="en-US" sz="2800" dirty="0" smtClean="0"/>
-              <a:t>H</a:t>
-            </a:r>
-            <a:r>
-              <a:rPr lang="en-US" sz="2800" dirty="0" smtClean="0"/>
-              <a:t>ard </a:t>
-            </a:r>
-            <a:r>
-              <a:rPr lang="en-US" sz="2800" dirty="0" smtClean="0"/>
-              <a:t>drug use at baseline (</a:t>
-            </a:r>
-            <a:r>
-              <a:rPr lang="en-US" sz="2800" dirty="0" smtClean="0"/>
-              <a:t>Yes (n =  467) vs</a:t>
-            </a:r>
-            <a:r>
-              <a:rPr lang="en-US" sz="2800" dirty="0" smtClean="0"/>
-              <a:t>. </a:t>
-            </a:r>
-            <a:r>
-              <a:rPr lang="en-US" sz="2800" dirty="0" smtClean="0"/>
-              <a:t>No (n = 39))</a:t>
-            </a:r>
-            <a:endParaRPr lang="en-US" sz="2800" dirty="0" smtClean="0"/>
+              <a:t>Hard drug use at baseline (Yes (n =  467) vs. No (n = 39))</a:t>
+            </a:r>
           </a:p>
           <a:p>
             <a:r>
               <a:rPr lang="en-US" sz="3200" dirty="0" smtClean="0"/>
               <a:t>Covariates selected by investigator</a:t>
             </a:r>
-            <a:endParaRPr lang="en-US" sz="3200" dirty="0" smtClean="0"/>
           </a:p>
           <a:p>
             <a:pPr lvl="1"/>
@@ -3732,11 +3710,7 @@
           <a:p>
             <a:r>
               <a:rPr lang="en-US" dirty="0" smtClean="0"/>
-              <a:t>Data Analysis </a:t>
-            </a:r>
-            <a:r>
-              <a:rPr lang="en-US" dirty="0" smtClean="0"/>
-              <a:t>Plan &amp; Questions</a:t>
+              <a:t>Data Analysis Plan &amp; Questions</a:t>
             </a:r>
             <a:endParaRPr lang="en-US" dirty="0"/>
           </a:p>
@@ -3754,13 +3728,13 @@
         </p:nvSpPr>
         <p:spPr>
           <a:xfrm>
-            <a:off x="838200" y="1548534"/>
-            <a:ext cx="10515600" cy="4944630"/>
+            <a:off x="634999" y="1594716"/>
+            <a:ext cx="11085945" cy="4944630"/>
           </a:xfrm>
         </p:spPr>
         <p:txBody>
           <a:bodyPr>
-            <a:normAutofit/>
+            <a:normAutofit lnSpcReduction="10000"/>
           </a:bodyPr>
           <a:lstStyle/>
           <a:p>
@@ -3768,24 +3742,45 @@
               <a:rPr lang="en-US" sz="3200" dirty="0" smtClean="0"/>
               <a:t>Outcomes</a:t>
             </a:r>
-            <a:endParaRPr lang="en-US" sz="3200" dirty="0" smtClean="0"/>
           </a:p>
           <a:p>
             <a:pPr lvl="1"/>
             <a:r>
+              <a:rPr lang="en-US" sz="2800" u="sng" dirty="0" smtClean="0"/>
+              <a:t>Laboratory: </a:t>
+            </a:r>
+            <a:r>
               <a:rPr lang="en-US" sz="2800" dirty="0" smtClean="0"/>
-              <a:t>Viral load, CD4+ count, SF36 MCS score, SC36 PCS score</a:t>
-            </a:r>
-            <a:endParaRPr lang="en-US" sz="2800" dirty="0" smtClean="0"/>
+              <a:t>Viral </a:t>
+            </a:r>
+            <a:r>
+              <a:rPr lang="en-US" sz="2800" dirty="0" smtClean="0"/>
+              <a:t>load, CD4+ </a:t>
+            </a:r>
+            <a:r>
+              <a:rPr lang="en-US" sz="2800" dirty="0" smtClean="0"/>
+              <a:t>count</a:t>
+            </a:r>
+          </a:p>
+          <a:p>
+            <a:pPr lvl="1"/>
+            <a:r>
+              <a:rPr lang="en-US" sz="2800" u="sng" dirty="0" smtClean="0"/>
+              <a:t>Quality of Life:</a:t>
+            </a:r>
+            <a:r>
+              <a:rPr lang="en-US" sz="2800" u="sng" dirty="0" smtClean="0"/>
+              <a:t> </a:t>
+            </a:r>
+            <a:r>
+              <a:rPr lang="en-US" sz="2800" dirty="0" smtClean="0"/>
+              <a:t>SF36 MCS score, SC36 PCS score</a:t>
+            </a:r>
           </a:p>
           <a:p>
             <a:r>
               <a:rPr lang="en-US" sz="3200" dirty="0" smtClean="0"/>
-              <a:t>Model </a:t>
-            </a:r>
-            <a:r>
-              <a:rPr lang="en-US" sz="3200" dirty="0" smtClean="0"/>
-              <a:t>plan</a:t>
+              <a:t>Model plan</a:t>
             </a:r>
           </a:p>
           <a:p>
@@ -3839,7 +3834,15 @@
             <a:pPr lvl="1"/>
             <a:r>
               <a:rPr lang="en-US" sz="2800" dirty="0" smtClean="0"/>
-              <a:t>Do you only want to include subjects with outcome data for all 4 outcomes?</a:t>
+              <a:t>Do you only want to include subjects with </a:t>
+            </a:r>
+            <a:r>
+              <a:rPr lang="en-US" sz="2800" dirty="0" smtClean="0"/>
+              <a:t>outcomes for </a:t>
+            </a:r>
+            <a:r>
+              <a:rPr lang="en-US" sz="2800" dirty="0" smtClean="0"/>
+              <a:t>all 4 outcomes?</a:t>
             </a:r>
           </a:p>
           <a:p>

</xml_diff>

<commit_message>
Added proposed primary outcome
</commit_message>
<xml_diff>
--- a/Project1/Reports/Project 1 Interim Presentation.pptx
+++ b/Project1/Reports/Project 1 Interim Presentation.pptx
@@ -311,7 +311,7 @@
           <a:p>
             <a:fld id="{1051E915-BC91-4BD6-BC90-BCDFE094BF0D}" type="datetimeFigureOut">
               <a:rPr lang="en-US" smtClean="0"/>
-              <a:t>9/24/2017</a:t>
+              <a:t>9/25/2017</a:t>
             </a:fld>
             <a:endParaRPr lang="en-US"/>
           </a:p>
@@ -532,7 +532,7 @@
           <a:p>
             <a:fld id="{1051E915-BC91-4BD6-BC90-BCDFE094BF0D}" type="datetimeFigureOut">
               <a:rPr lang="en-US" smtClean="0"/>
-              <a:t>9/24/2017</a:t>
+              <a:t>9/25/2017</a:t>
             </a:fld>
             <a:endParaRPr lang="en-US"/>
           </a:p>
@@ -712,7 +712,7 @@
           <a:p>
             <a:fld id="{1051E915-BC91-4BD6-BC90-BCDFE094BF0D}" type="datetimeFigureOut">
               <a:rPr lang="en-US" smtClean="0"/>
-              <a:t>9/24/2017</a:t>
+              <a:t>9/25/2017</a:t>
             </a:fld>
             <a:endParaRPr lang="en-US"/>
           </a:p>
@@ -882,7 +882,7 @@
           <a:p>
             <a:fld id="{1051E915-BC91-4BD6-BC90-BCDFE094BF0D}" type="datetimeFigureOut">
               <a:rPr lang="en-US" smtClean="0"/>
-              <a:t>9/24/2017</a:t>
+              <a:t>9/25/2017</a:t>
             </a:fld>
             <a:endParaRPr lang="en-US"/>
           </a:p>
@@ -1133,7 +1133,7 @@
           <a:p>
             <a:fld id="{1051E915-BC91-4BD6-BC90-BCDFE094BF0D}" type="datetimeFigureOut">
               <a:rPr lang="en-US" smtClean="0"/>
-              <a:t>9/24/2017</a:t>
+              <a:t>9/25/2017</a:t>
             </a:fld>
             <a:endParaRPr lang="en-US"/>
           </a:p>
@@ -1456,7 +1456,7 @@
           <a:p>
             <a:fld id="{1051E915-BC91-4BD6-BC90-BCDFE094BF0D}" type="datetimeFigureOut">
               <a:rPr lang="en-US" smtClean="0"/>
-              <a:t>9/24/2017</a:t>
+              <a:t>9/25/2017</a:t>
             </a:fld>
             <a:endParaRPr lang="en-US"/>
           </a:p>
@@ -1880,7 +1880,7 @@
           <a:p>
             <a:fld id="{1051E915-BC91-4BD6-BC90-BCDFE094BF0D}" type="datetimeFigureOut">
               <a:rPr lang="en-US" smtClean="0"/>
-              <a:t>9/24/2017</a:t>
+              <a:t>9/25/2017</a:t>
             </a:fld>
             <a:endParaRPr lang="en-US"/>
           </a:p>
@@ -1998,7 +1998,7 @@
           <a:p>
             <a:fld id="{1051E915-BC91-4BD6-BC90-BCDFE094BF0D}" type="datetimeFigureOut">
               <a:rPr lang="en-US" smtClean="0"/>
-              <a:t>9/24/2017</a:t>
+              <a:t>9/25/2017</a:t>
             </a:fld>
             <a:endParaRPr lang="en-US"/>
           </a:p>
@@ -2093,7 +2093,7 @@
           <a:p>
             <a:fld id="{1051E915-BC91-4BD6-BC90-BCDFE094BF0D}" type="datetimeFigureOut">
               <a:rPr lang="en-US" smtClean="0"/>
-              <a:t>9/24/2017</a:t>
+              <a:t>9/25/2017</a:t>
             </a:fld>
             <a:endParaRPr lang="en-US"/>
           </a:p>
@@ -2383,7 +2383,7 @@
           <a:p>
             <a:fld id="{1051E915-BC91-4BD6-BC90-BCDFE094BF0D}" type="datetimeFigureOut">
               <a:rPr lang="en-US" smtClean="0"/>
-              <a:t>9/24/2017</a:t>
+              <a:t>9/25/2017</a:t>
             </a:fld>
             <a:endParaRPr lang="en-US"/>
           </a:p>
@@ -2655,7 +2655,7 @@
           <a:p>
             <a:fld id="{1051E915-BC91-4BD6-BC90-BCDFE094BF0D}" type="datetimeFigureOut">
               <a:rPr lang="en-US" smtClean="0"/>
-              <a:t>9/24/2017</a:t>
+              <a:t>9/25/2017</a:t>
             </a:fld>
             <a:endParaRPr lang="en-US"/>
           </a:p>
@@ -2908,7 +2908,7 @@
           <a:p>
             <a:fld id="{1051E915-BC91-4BD6-BC90-BCDFE094BF0D}" type="datetimeFigureOut">
               <a:rPr lang="en-US" smtClean="0"/>
-              <a:t>9/24/2017</a:t>
+              <a:t>9/25/2017</a:t>
             </a:fld>
             <a:endParaRPr lang="en-US"/>
           </a:p>
@@ -3728,13 +3728,13 @@
         </p:nvSpPr>
         <p:spPr>
           <a:xfrm>
-            <a:off x="634999" y="1594716"/>
-            <a:ext cx="11085945" cy="4944630"/>
+            <a:off x="634999" y="1594715"/>
+            <a:ext cx="11085945" cy="5387975"/>
           </a:xfrm>
         </p:spPr>
         <p:txBody>
           <a:bodyPr>
-            <a:normAutofit lnSpcReduction="10000"/>
+            <a:normAutofit fontScale="92500" lnSpcReduction="10000"/>
           </a:bodyPr>
           <a:lstStyle/>
           <a:p>
@@ -3751,31 +3751,35 @@
             </a:r>
             <a:r>
               <a:rPr lang="en-US" sz="2800" dirty="0" smtClean="0"/>
-              <a:t>Viral </a:t>
+              <a:t>Viral load, CD4+ count</a:t>
+            </a:r>
+          </a:p>
+          <a:p>
+            <a:pPr lvl="1"/>
+            <a:r>
+              <a:rPr lang="en-US" sz="2800" u="sng" dirty="0" smtClean="0"/>
+              <a:t>Quality of Life: </a:t>
             </a:r>
             <a:r>
               <a:rPr lang="en-US" sz="2800" dirty="0" smtClean="0"/>
-              <a:t>load, CD4+ </a:t>
+              <a:t>SF36 MCS score, SC36 PCS </a:t>
             </a:r>
             <a:r>
               <a:rPr lang="en-US" sz="2800" dirty="0" smtClean="0"/>
-              <a:t>count</a:t>
+              <a:t>score</a:t>
             </a:r>
           </a:p>
           <a:p>
             <a:pPr lvl="1"/>
             <a:r>
               <a:rPr lang="en-US" sz="2800" u="sng" dirty="0" smtClean="0"/>
-              <a:t>Quality of Life:</a:t>
-            </a:r>
-            <a:r>
-              <a:rPr lang="en-US" sz="2800" u="sng" dirty="0" smtClean="0"/>
-              <a:t> </a:t>
+              <a:t>Proposed primary outcome:</a:t>
             </a:r>
             <a:r>
               <a:rPr lang="en-US" sz="2800" dirty="0" smtClean="0"/>
-              <a:t>SF36 MCS score, SC36 PCS score</a:t>
-            </a:r>
+              <a:t> CD4+ because normally distributed, few outliers, proven to be clinically relevant in HIV+ population</a:t>
+            </a:r>
+            <a:endParaRPr lang="en-US" sz="2800" u="sng" dirty="0" smtClean="0"/>
           </a:p>
           <a:p>
             <a:r>
@@ -3834,15 +3838,7 @@
             <a:pPr lvl="1"/>
             <a:r>
               <a:rPr lang="en-US" sz="2800" dirty="0" smtClean="0"/>
-              <a:t>Do you only want to include subjects with </a:t>
-            </a:r>
-            <a:r>
-              <a:rPr lang="en-US" sz="2800" dirty="0" smtClean="0"/>
-              <a:t>outcomes for </a:t>
-            </a:r>
-            <a:r>
-              <a:rPr lang="en-US" sz="2800" dirty="0" smtClean="0"/>
-              <a:t>all 4 outcomes?</a:t>
+              <a:t>Do you only want to include subjects with outcomes for all 4 outcomes?</a:t>
             </a:r>
           </a:p>
           <a:p>

</xml_diff>